<commit_message>
Update Monolith First Presentation.pptx
</commit_message>
<xml_diff>
--- a/2022-05-12 Designing Monolith First (TR)/Monolith First Presentation.pptx
+++ b/2022-05-12 Designing Monolith First (TR)/Monolith First Presentation.pptx
@@ -290,7 +290,7 @@
           <a:p>
             <a:fld id="{2A14C9FE-EBC3-45D3-899C-58AAF4F8AF71}" type="datetimeFigureOut">
               <a:rPr lang="en-US" smtClean="0"/>
-              <a:t>27-Feb-22</a:t>
+              <a:t>18-Apr-22</a:t>
             </a:fld>
             <a:endParaRPr lang="en-US"/>
           </a:p>
@@ -488,7 +488,7 @@
           <a:p>
             <a:fld id="{2A14C9FE-EBC3-45D3-899C-58AAF4F8AF71}" type="datetimeFigureOut">
               <a:rPr lang="en-US" smtClean="0"/>
-              <a:t>27-Feb-22</a:t>
+              <a:t>18-Apr-22</a:t>
             </a:fld>
             <a:endParaRPr lang="en-US"/>
           </a:p>
@@ -696,7 +696,7 @@
           <a:p>
             <a:fld id="{2A14C9FE-EBC3-45D3-899C-58AAF4F8AF71}" type="datetimeFigureOut">
               <a:rPr lang="en-US" smtClean="0"/>
-              <a:t>27-Feb-22</a:t>
+              <a:t>18-Apr-22</a:t>
             </a:fld>
             <a:endParaRPr lang="en-US"/>
           </a:p>
@@ -894,7 +894,7 @@
           <a:p>
             <a:fld id="{2A14C9FE-EBC3-45D3-899C-58AAF4F8AF71}" type="datetimeFigureOut">
               <a:rPr lang="en-US" smtClean="0"/>
-              <a:t>27-Feb-22</a:t>
+              <a:t>18-Apr-22</a:t>
             </a:fld>
             <a:endParaRPr lang="en-US"/>
           </a:p>
@@ -1169,7 +1169,7 @@
           <a:p>
             <a:fld id="{2A14C9FE-EBC3-45D3-899C-58AAF4F8AF71}" type="datetimeFigureOut">
               <a:rPr lang="en-US" smtClean="0"/>
-              <a:t>27-Feb-22</a:t>
+              <a:t>18-Apr-22</a:t>
             </a:fld>
             <a:endParaRPr lang="en-US"/>
           </a:p>
@@ -1434,7 +1434,7 @@
           <a:p>
             <a:fld id="{2A14C9FE-EBC3-45D3-899C-58AAF4F8AF71}" type="datetimeFigureOut">
               <a:rPr lang="en-US" smtClean="0"/>
-              <a:t>27-Feb-22</a:t>
+              <a:t>18-Apr-22</a:t>
             </a:fld>
             <a:endParaRPr lang="en-US"/>
           </a:p>
@@ -1846,7 +1846,7 @@
           <a:p>
             <a:fld id="{2A14C9FE-EBC3-45D3-899C-58AAF4F8AF71}" type="datetimeFigureOut">
               <a:rPr lang="en-US" smtClean="0"/>
-              <a:t>27-Feb-22</a:t>
+              <a:t>18-Apr-22</a:t>
             </a:fld>
             <a:endParaRPr lang="en-US"/>
           </a:p>
@@ -1987,7 +1987,7 @@
           <a:p>
             <a:fld id="{2A14C9FE-EBC3-45D3-899C-58AAF4F8AF71}" type="datetimeFigureOut">
               <a:rPr lang="en-US" smtClean="0"/>
-              <a:t>27-Feb-22</a:t>
+              <a:t>18-Apr-22</a:t>
             </a:fld>
             <a:endParaRPr lang="en-US"/>
           </a:p>
@@ -2100,7 +2100,7 @@
           <a:p>
             <a:fld id="{2A14C9FE-EBC3-45D3-899C-58AAF4F8AF71}" type="datetimeFigureOut">
               <a:rPr lang="en-US" smtClean="0"/>
-              <a:t>27-Feb-22</a:t>
+              <a:t>18-Apr-22</a:t>
             </a:fld>
             <a:endParaRPr lang="en-US"/>
           </a:p>
@@ -2411,7 +2411,7 @@
           <a:p>
             <a:fld id="{2A14C9FE-EBC3-45D3-899C-58AAF4F8AF71}" type="datetimeFigureOut">
               <a:rPr lang="en-US" smtClean="0"/>
-              <a:t>27-Feb-22</a:t>
+              <a:t>18-Apr-22</a:t>
             </a:fld>
             <a:endParaRPr lang="en-US"/>
           </a:p>
@@ -2699,7 +2699,7 @@
           <a:p>
             <a:fld id="{2A14C9FE-EBC3-45D3-899C-58AAF4F8AF71}" type="datetimeFigureOut">
               <a:rPr lang="en-US" smtClean="0"/>
-              <a:t>27-Feb-22</a:t>
+              <a:t>18-Apr-22</a:t>
             </a:fld>
             <a:endParaRPr lang="en-US"/>
           </a:p>
@@ -2940,7 +2940,7 @@
           <a:p>
             <a:fld id="{2A14C9FE-EBC3-45D3-899C-58AAF4F8AF71}" type="datetimeFigureOut">
               <a:rPr lang="en-US" smtClean="0"/>
-              <a:t>27-Feb-22</a:t>
+              <a:t>18-Apr-22</a:t>
             </a:fld>
             <a:endParaRPr lang="en-US"/>
           </a:p>
@@ -3569,7 +3569,7 @@
                 <a:latin typeface="Euclid Circular B" panose="020B0504000000000000" pitchFamily="34" charset="0"/>
                 <a:ea typeface="Euclid Circular B" panose="020B0504000000000000" pitchFamily="34" charset="0"/>
               </a:rPr>
-              <a:t>23,000 commits</a:t>
+              <a:t>24,000 commits</a:t>
             </a:r>
           </a:p>
           <a:p>
@@ -3579,7 +3579,7 @@
                 <a:latin typeface="Euclid Circular B" panose="020B0504000000000000" pitchFamily="34" charset="0"/>
                 <a:ea typeface="Euclid Circular B" panose="020B0504000000000000" pitchFamily="34" charset="0"/>
               </a:rPr>
-              <a:t>231 contributors</a:t>
+              <a:t>238 contributors</a:t>
             </a:r>
           </a:p>
           <a:p>
@@ -3589,7 +3589,7 @@
                 <a:latin typeface="Euclid Circular B" panose="020B0504000000000000" pitchFamily="34" charset="0"/>
                 <a:ea typeface="Euclid Circular B" panose="020B0504000000000000" pitchFamily="34" charset="0"/>
               </a:rPr>
-              <a:t>6,000 issues &amp; 5,000 PRs closed</a:t>
+              <a:t>6,200 issues &amp; 5,200 PRs closed</a:t>
             </a:r>
           </a:p>
           <a:p>
@@ -3608,7 +3608,7 @@
                 <a:latin typeface="Euclid Circular B" panose="020B0504000000000000" pitchFamily="34" charset="0"/>
                 <a:ea typeface="Euclid Circular B" panose="020B0504000000000000" pitchFamily="34" charset="0"/>
               </a:rPr>
-              <a:t>125 releases</a:t>
+              <a:t>128 releases</a:t>
             </a:r>
           </a:p>
           <a:p>
@@ -8492,7 +8492,7 @@
                 <a:latin typeface="Euclid Circular B" panose="020B0504000000000000" pitchFamily="34" charset="0"/>
                 <a:ea typeface="Euclid Circular B" panose="020B0504000000000000" pitchFamily="34" charset="0"/>
               </a:rPr>
-              <a:t>About me</a:t>
+              <a:t>Title</a:t>
             </a:r>
           </a:p>
         </p:txBody>
@@ -8612,7 +8612,7 @@
                 <a:latin typeface="Euclid Circular B" panose="020B0504000000000000" pitchFamily="34" charset="0"/>
                 <a:ea typeface="Euclid Circular B" panose="020B0504000000000000" pitchFamily="34" charset="0"/>
               </a:rPr>
-              <a:t>About me</a:t>
+              <a:t>Title</a:t>
             </a:r>
           </a:p>
         </p:txBody>
@@ -8871,7 +8871,7 @@
                 <a:latin typeface="Euclid Circular B" panose="020B0504000000000000" pitchFamily="34" charset="0"/>
                 <a:ea typeface="Euclid Circular B" panose="020B0504000000000000" pitchFamily="34" charset="0"/>
               </a:rPr>
-              <a:t>About me</a:t>
+              <a:t>Title</a:t>
             </a:r>
           </a:p>
         </p:txBody>
@@ -8991,7 +8991,7 @@
                 <a:latin typeface="Euclid Circular B" panose="020B0504000000000000" pitchFamily="34" charset="0"/>
                 <a:ea typeface="Euclid Circular B" panose="020B0504000000000000" pitchFamily="34" charset="0"/>
               </a:rPr>
-              <a:t>About me</a:t>
+              <a:t>Title</a:t>
             </a:r>
           </a:p>
         </p:txBody>
@@ -9231,7 +9231,7 @@
                 <a:latin typeface="Euclid Circular B" panose="020B0504000000000000" pitchFamily="34" charset="0"/>
                 <a:ea typeface="Euclid Circular B" panose="020B0504000000000000" pitchFamily="34" charset="0"/>
               </a:rPr>
-              <a:t>About me</a:t>
+              <a:t>Title</a:t>
             </a:r>
           </a:p>
         </p:txBody>
@@ -9351,7 +9351,7 @@
                 <a:latin typeface="Euclid Circular B" panose="020B0504000000000000" pitchFamily="34" charset="0"/>
                 <a:ea typeface="Euclid Circular B" panose="020B0504000000000000" pitchFamily="34" charset="0"/>
               </a:rPr>
-              <a:t>About me</a:t>
+              <a:t>Title</a:t>
             </a:r>
           </a:p>
         </p:txBody>
@@ -9471,7 +9471,7 @@
                 <a:latin typeface="Euclid Circular B" panose="020B0504000000000000" pitchFamily="34" charset="0"/>
                 <a:ea typeface="Euclid Circular B" panose="020B0504000000000000" pitchFamily="34" charset="0"/>
               </a:rPr>
-              <a:t>About me</a:t>
+              <a:t>Title</a:t>
             </a:r>
           </a:p>
         </p:txBody>
@@ -9591,7 +9591,7 @@
                 <a:latin typeface="Euclid Circular B" panose="020B0504000000000000" pitchFamily="34" charset="0"/>
                 <a:ea typeface="Euclid Circular B" panose="020B0504000000000000" pitchFamily="34" charset="0"/>
               </a:rPr>
-              <a:t>About me</a:t>
+              <a:t>Title</a:t>
             </a:r>
           </a:p>
         </p:txBody>
@@ -9831,7 +9831,7 @@
                 <a:latin typeface="Euclid Circular B" panose="020B0504000000000000" pitchFamily="34" charset="0"/>
                 <a:ea typeface="Euclid Circular B" panose="020B0504000000000000" pitchFamily="34" charset="0"/>
               </a:rPr>
-              <a:t>About me</a:t>
+              <a:t>Title</a:t>
             </a:r>
           </a:p>
         </p:txBody>
@@ -9951,7 +9951,7 @@
                 <a:latin typeface="Euclid Circular B" panose="020B0504000000000000" pitchFamily="34" charset="0"/>
                 <a:ea typeface="Euclid Circular B" panose="020B0504000000000000" pitchFamily="34" charset="0"/>
               </a:rPr>
-              <a:t>About me</a:t>
+              <a:t>Title</a:t>
             </a:r>
           </a:p>
         </p:txBody>
@@ -10064,15 +10064,22 @@
           <a:lstStyle/>
           <a:p>
             <a:r>
-              <a:rPr lang="en-US" b="1" dirty="0">
+              <a:rPr lang="en-US" b="1">
                 <a:solidFill>
                   <a:srgbClr val="292D33"/>
                 </a:solidFill>
                 <a:latin typeface="Euclid Circular B" panose="020B0504000000000000" pitchFamily="34" charset="0"/>
                 <a:ea typeface="Euclid Circular B" panose="020B0504000000000000" pitchFamily="34" charset="0"/>
               </a:rPr>
-              <a:t>About me</a:t>
-            </a:r>
+              <a:t>Title</a:t>
+            </a:r>
+            <a:endParaRPr lang="en-US" b="1" dirty="0">
+              <a:solidFill>
+                <a:srgbClr val="292D33"/>
+              </a:solidFill>
+              <a:latin typeface="Euclid Circular B" panose="020B0504000000000000" pitchFamily="34" charset="0"/>
+              <a:ea typeface="Euclid Circular B" panose="020B0504000000000000" pitchFamily="34" charset="0"/>
+            </a:endParaRPr>
           </a:p>
         </p:txBody>
       </p:sp>
@@ -10404,7 +10411,7 @@
           <a:graphicData uri="http://schemas.openxmlformats.org/presentationml/2006/ole">
             <mc:AlternateContent xmlns:mc="http://schemas.openxmlformats.org/markup-compatibility/2006">
               <mc:Choice xmlns:v="urn:schemas-microsoft-com:vml" Requires="v">
-                <p:oleObj spid="_x0000_s2062" name="Bitmap Image" r:id="rId4" imgW="12553920" imgH="8362800" progId="Paint.Picture">
+                <p:oleObj spid="_x0000_s2065" name="Bitmap Image" r:id="rId4" imgW="12553920" imgH="8362800" progId="Paint.Picture">
                   <p:embed/>
                 </p:oleObj>
               </mc:Choice>
@@ -12025,7 +12032,7 @@
           <a:graphicData uri="http://schemas.openxmlformats.org/presentationml/2006/ole">
             <mc:AlternateContent xmlns:mc="http://schemas.openxmlformats.org/markup-compatibility/2006">
               <mc:Choice xmlns:v="urn:schemas-microsoft-com:vml" Requires="v">
-                <p:oleObj spid="_x0000_s3084" name="Bitmap Image" r:id="rId4" imgW="17059320" imgH="5762520" progId="Paint.Picture">
+                <p:oleObj spid="_x0000_s3087" name="Bitmap Image" r:id="rId4" imgW="17059320" imgH="5762520" progId="Paint.Picture">
                   <p:embed/>
                 </p:oleObj>
               </mc:Choice>

</xml_diff>

<commit_message>
Added abp layered solution
</commit_message>
<xml_diff>
--- a/2022-05-12 Designing Monolith First (TR)/Monolith First Presentation.pptx
+++ b/2022-05-12 Designing Monolith First (TR)/Monolith First Presentation.pptx
@@ -17053,7 +17053,7 @@
           <a:graphicData uri="http://schemas.openxmlformats.org/presentationml/2006/ole">
             <mc:AlternateContent xmlns:mc="http://schemas.openxmlformats.org/markup-compatibility/2006">
               <mc:Choice xmlns:v="urn:schemas-microsoft-com:vml" Requires="v">
-                <p:oleObj spid="_x0000_s2089" name="Bitmap Image" r:id="rId4" imgW="12553920" imgH="8362800" progId="Paint.Picture">
+                <p:oleObj spid="_x0000_s2091" name="Bitmap Image" r:id="rId4" imgW="12553920" imgH="8362800" progId="Paint.Picture">
                   <p:embed/>
                 </p:oleObj>
               </mc:Choice>
@@ -18674,7 +18674,7 @@
           <a:graphicData uri="http://schemas.openxmlformats.org/presentationml/2006/ole">
             <mc:AlternateContent xmlns:mc="http://schemas.openxmlformats.org/markup-compatibility/2006">
               <mc:Choice xmlns:v="urn:schemas-microsoft-com:vml" Requires="v">
-                <p:oleObj spid="_x0000_s3111" name="Bitmap Image" r:id="rId4" imgW="17059320" imgH="5762520" progId="Paint.Picture">
+                <p:oleObj spid="_x0000_s3113" name="Bitmap Image" r:id="rId4" imgW="17059320" imgH="5762520" progId="Paint.Picture">
                   <p:embed/>
                 </p:oleObj>
               </mc:Choice>

</xml_diff>

<commit_message>
Renamed the project folder.
</commit_message>
<xml_diff>
--- a/2022-05-12 Designing Monolith First (TR)/Monolith First Presentation.pptx
+++ b/2022-05-12 Designing Monolith First (TR)/Monolith First Presentation.pptx
@@ -320,7 +320,7 @@
           <a:p>
             <a:fld id="{2A14C9FE-EBC3-45D3-899C-58AAF4F8AF71}" type="datetimeFigureOut">
               <a:rPr lang="en-US" smtClean="0"/>
-              <a:t>21-Apr-22</a:t>
+              <a:t>24-Apr-22</a:t>
             </a:fld>
             <a:endParaRPr lang="en-US"/>
           </a:p>
@@ -518,7 +518,7 @@
           <a:p>
             <a:fld id="{2A14C9FE-EBC3-45D3-899C-58AAF4F8AF71}" type="datetimeFigureOut">
               <a:rPr lang="en-US" smtClean="0"/>
-              <a:t>21-Apr-22</a:t>
+              <a:t>24-Apr-22</a:t>
             </a:fld>
             <a:endParaRPr lang="en-US"/>
           </a:p>
@@ -726,7 +726,7 @@
           <a:p>
             <a:fld id="{2A14C9FE-EBC3-45D3-899C-58AAF4F8AF71}" type="datetimeFigureOut">
               <a:rPr lang="en-US" smtClean="0"/>
-              <a:t>21-Apr-22</a:t>
+              <a:t>24-Apr-22</a:t>
             </a:fld>
             <a:endParaRPr lang="en-US"/>
           </a:p>
@@ -924,7 +924,7 @@
           <a:p>
             <a:fld id="{2A14C9FE-EBC3-45D3-899C-58AAF4F8AF71}" type="datetimeFigureOut">
               <a:rPr lang="en-US" smtClean="0"/>
-              <a:t>21-Apr-22</a:t>
+              <a:t>24-Apr-22</a:t>
             </a:fld>
             <a:endParaRPr lang="en-US"/>
           </a:p>
@@ -1199,7 +1199,7 @@
           <a:p>
             <a:fld id="{2A14C9FE-EBC3-45D3-899C-58AAF4F8AF71}" type="datetimeFigureOut">
               <a:rPr lang="en-US" smtClean="0"/>
-              <a:t>21-Apr-22</a:t>
+              <a:t>24-Apr-22</a:t>
             </a:fld>
             <a:endParaRPr lang="en-US"/>
           </a:p>
@@ -1464,7 +1464,7 @@
           <a:p>
             <a:fld id="{2A14C9FE-EBC3-45D3-899C-58AAF4F8AF71}" type="datetimeFigureOut">
               <a:rPr lang="en-US" smtClean="0"/>
-              <a:t>21-Apr-22</a:t>
+              <a:t>24-Apr-22</a:t>
             </a:fld>
             <a:endParaRPr lang="en-US"/>
           </a:p>
@@ -1876,7 +1876,7 @@
           <a:p>
             <a:fld id="{2A14C9FE-EBC3-45D3-899C-58AAF4F8AF71}" type="datetimeFigureOut">
               <a:rPr lang="en-US" smtClean="0"/>
-              <a:t>21-Apr-22</a:t>
+              <a:t>24-Apr-22</a:t>
             </a:fld>
             <a:endParaRPr lang="en-US"/>
           </a:p>
@@ -2017,7 +2017,7 @@
           <a:p>
             <a:fld id="{2A14C9FE-EBC3-45D3-899C-58AAF4F8AF71}" type="datetimeFigureOut">
               <a:rPr lang="en-US" smtClean="0"/>
-              <a:t>21-Apr-22</a:t>
+              <a:t>24-Apr-22</a:t>
             </a:fld>
             <a:endParaRPr lang="en-US"/>
           </a:p>
@@ -2130,7 +2130,7 @@
           <a:p>
             <a:fld id="{2A14C9FE-EBC3-45D3-899C-58AAF4F8AF71}" type="datetimeFigureOut">
               <a:rPr lang="en-US" smtClean="0"/>
-              <a:t>21-Apr-22</a:t>
+              <a:t>24-Apr-22</a:t>
             </a:fld>
             <a:endParaRPr lang="en-US"/>
           </a:p>
@@ -2441,7 +2441,7 @@
           <a:p>
             <a:fld id="{2A14C9FE-EBC3-45D3-899C-58AAF4F8AF71}" type="datetimeFigureOut">
               <a:rPr lang="en-US" smtClean="0"/>
-              <a:t>21-Apr-22</a:t>
+              <a:t>24-Apr-22</a:t>
             </a:fld>
             <a:endParaRPr lang="en-US"/>
           </a:p>
@@ -2729,7 +2729,7 @@
           <a:p>
             <a:fld id="{2A14C9FE-EBC3-45D3-899C-58AAF4F8AF71}" type="datetimeFigureOut">
               <a:rPr lang="en-US" smtClean="0"/>
-              <a:t>21-Apr-22</a:t>
+              <a:t>24-Apr-22</a:t>
             </a:fld>
             <a:endParaRPr lang="en-US"/>
           </a:p>
@@ -2970,7 +2970,7 @@
           <a:p>
             <a:fld id="{2A14C9FE-EBC3-45D3-899C-58AAF4F8AF71}" type="datetimeFigureOut">
               <a:rPr lang="en-US" smtClean="0"/>
-              <a:t>21-Apr-22</a:t>
+              <a:t>24-Apr-22</a:t>
             </a:fld>
             <a:endParaRPr lang="en-US"/>
           </a:p>
@@ -30986,7 +30986,7 @@
           <a:graphicData uri="http://schemas.openxmlformats.org/presentationml/2006/ole">
             <mc:AlternateContent xmlns:mc="http://schemas.openxmlformats.org/markup-compatibility/2006">
               <mc:Choice xmlns:v="urn:schemas-microsoft-com:vml" Requires="v">
-                <p:oleObj spid="_x0000_s4122" name="Bitmap Image" r:id="rId4" imgW="8801280" imgH="2933640" progId="Paint.Picture">
+                <p:oleObj spid="_x0000_s4126" name="Bitmap Image" r:id="rId4" imgW="8801280" imgH="2933640" progId="Paint.Picture">
                   <p:embed/>
                 </p:oleObj>
               </mc:Choice>
@@ -31180,7 +31180,7 @@
           <a:graphicData uri="http://schemas.openxmlformats.org/presentationml/2006/ole">
             <mc:AlternateContent xmlns:mc="http://schemas.openxmlformats.org/markup-compatibility/2006">
               <mc:Choice xmlns:v="urn:schemas-microsoft-com:vml" Requires="v">
-                <p:oleObj spid="_x0000_s5146" name="Bitmap Image" r:id="rId4" imgW="8744040" imgH="3753000" progId="Paint.Picture">
+                <p:oleObj spid="_x0000_s5150" name="Bitmap Image" r:id="rId4" imgW="8744040" imgH="3753000" progId="Paint.Picture">
                   <p:embed/>
                 </p:oleObj>
               </mc:Choice>
@@ -34643,7 +34643,9 @@
           </a:xfrm>
         </p:spPr>
         <p:txBody>
-          <a:bodyPr/>
+          <a:bodyPr>
+            <a:normAutofit lnSpcReduction="10000"/>
+          </a:bodyPr>
           <a:lstStyle/>
           <a:p>
             <a:r>
@@ -34713,11 +34715,48 @@
           </a:p>
           <a:p>
             <a:r>
+              <a:rPr lang="en-US" b="1" dirty="0">
+                <a:latin typeface="Euclid Circular B" panose="020B0504000000000000" pitchFamily="34" charset="0"/>
+                <a:ea typeface="Euclid Circular B" panose="020B0504000000000000" pitchFamily="34" charset="0"/>
+              </a:rPr>
+              <a:t>Monolith hosting </a:t>
+            </a:r>
+            <a:r>
               <a:rPr lang="en-US" dirty="0">
                 <a:latin typeface="Euclid Circular B" panose="020B0504000000000000" pitchFamily="34" charset="0"/>
                 <a:ea typeface="Euclid Circular B" panose="020B0504000000000000" pitchFamily="34" charset="0"/>
               </a:rPr>
-              <a:t>Hosting application brings the implementations together</a:t>
+              <a:t>application brings the implementations together</a:t>
+            </a:r>
+          </a:p>
+          <a:p>
+            <a:r>
+              <a:rPr lang="en-US" dirty="0">
+                <a:latin typeface="Euclid Circular B" panose="020B0504000000000000" pitchFamily="34" charset="0"/>
+                <a:ea typeface="Euclid Circular B" panose="020B0504000000000000" pitchFamily="34" charset="0"/>
+              </a:rPr>
+              <a:t>Microservice hosting application uses the </a:t>
+            </a:r>
+            <a:r>
+              <a:rPr lang="en-US" b="1" i="1" dirty="0" err="1">
+                <a:latin typeface="Euclid Circular B" panose="020B0504000000000000" pitchFamily="34" charset="0"/>
+                <a:ea typeface="Euclid Circular B" panose="020B0504000000000000" pitchFamily="34" charset="0"/>
+              </a:rPr>
+              <a:t>Customers.HttpApi.Client</a:t>
+            </a:r>
+            <a:r>
+              <a:rPr lang="en-US" b="1" i="1" dirty="0">
+                <a:latin typeface="Euclid Circular B" panose="020B0504000000000000" pitchFamily="34" charset="0"/>
+                <a:ea typeface="Euclid Circular B" panose="020B0504000000000000" pitchFamily="34" charset="0"/>
+              </a:rPr>
+              <a:t> </a:t>
+            </a:r>
+            <a:r>
+              <a:rPr lang="en-US" dirty="0">
+                <a:latin typeface="Euclid Circular B" panose="020B0504000000000000" pitchFamily="34" charset="0"/>
+                <a:ea typeface="Euclid Circular B" panose="020B0504000000000000" pitchFamily="34" charset="0"/>
+              </a:rPr>
+              <a:t>project</a:t>
             </a:r>
           </a:p>
         </p:txBody>
@@ -34895,22 +34934,20 @@
       </p:cxnSp>
       <p:cxnSp>
         <p:nvCxnSpPr>
-          <p:cNvPr id="11" name="Straight Arrow Connector 10">
-            <a:extLst>
-              <a:ext uri="{FF2B5EF4-FFF2-40B4-BE49-F238E27FC236}">
-                <a16:creationId xmlns:a16="http://schemas.microsoft.com/office/drawing/2014/main" id="{7DC916DF-FFEF-47BE-AD11-F42F0697209E}"/>
-              </a:ext>
-            </a:extLst>
-          </p:cNvPr>
-          <p:cNvCxnSpPr>
-            <a:cxnSpLocks/>
-          </p:cNvCxnSpPr>
+          <p:cNvPr id="8" name="Straight Arrow Connector 7">
+            <a:extLst>
+              <a:ext uri="{FF2B5EF4-FFF2-40B4-BE49-F238E27FC236}">
+                <a16:creationId xmlns:a16="http://schemas.microsoft.com/office/drawing/2014/main" id="{76B11EAF-E153-4086-A93F-28C3A77B2E68}"/>
+              </a:ext>
+            </a:extLst>
+          </p:cNvPr>
+          <p:cNvCxnSpPr/>
           <p:nvPr/>
         </p:nvCxnSpPr>
         <p:spPr>
-          <a:xfrm>
-            <a:off x="3270305" y="2194559"/>
-            <a:ext cx="2067340" cy="1037644"/>
+          <a:xfrm flipH="1">
+            <a:off x="7677339" y="2162755"/>
+            <a:ext cx="470780" cy="0"/>
           </a:xfrm>
           <a:prstGeom prst="straightConnector1">
             <a:avLst/>
@@ -34940,22 +34977,20 @@
       </p:cxnSp>
       <p:cxnSp>
         <p:nvCxnSpPr>
-          <p:cNvPr id="22" name="Straight Arrow Connector 21">
-            <a:extLst>
-              <a:ext uri="{FF2B5EF4-FFF2-40B4-BE49-F238E27FC236}">
-                <a16:creationId xmlns:a16="http://schemas.microsoft.com/office/drawing/2014/main" id="{BBF9579B-1E1B-41FF-B7D7-2D8BCDCF2D9E}"/>
-              </a:ext>
-            </a:extLst>
-          </p:cNvPr>
-          <p:cNvCxnSpPr>
-            <a:cxnSpLocks/>
-          </p:cNvCxnSpPr>
+          <p:cNvPr id="12" name="Straight Arrow Connector 11">
+            <a:extLst>
+              <a:ext uri="{FF2B5EF4-FFF2-40B4-BE49-F238E27FC236}">
+                <a16:creationId xmlns:a16="http://schemas.microsoft.com/office/drawing/2014/main" id="{B72977B2-342B-4414-9413-7C59FC51E989}"/>
+              </a:ext>
+            </a:extLst>
+          </p:cNvPr>
+          <p:cNvCxnSpPr/>
           <p:nvPr/>
         </p:nvCxnSpPr>
         <p:spPr>
-          <a:xfrm flipV="1">
-            <a:off x="7769750" y="2403835"/>
-            <a:ext cx="209121" cy="828368"/>
+          <a:xfrm flipH="1">
+            <a:off x="7820408" y="3248216"/>
+            <a:ext cx="470780" cy="0"/>
           </a:xfrm>
           <a:prstGeom prst="straightConnector1">
             <a:avLst/>
@@ -35048,33 +35083,15 @@
                                   </p:childTnLst>
                                 </p:cTn>
                               </p:par>
-                            </p:childTnLst>
-                          </p:cTn>
-                        </p:par>
-                      </p:childTnLst>
-                    </p:cTn>
-                  </p:par>
-                  <p:par>
-                    <p:cTn id="8" fill="hold">
-                      <p:stCondLst>
-                        <p:cond delay="indefinite"/>
-                      </p:stCondLst>
-                      <p:childTnLst>
-                        <p:par>
-                          <p:cTn id="9" fill="hold">
-                            <p:stCondLst>
-                              <p:cond delay="0"/>
-                            </p:stCondLst>
-                            <p:childTnLst>
                               <p:par>
-                                <p:cTn id="10" presetID="10" presetClass="entr" presetSubtype="0" fill="hold" nodeType="clickEffect">
+                                <p:cTn id="8" presetID="10" presetClass="entr" presetSubtype="0" fill="hold" nodeType="withEffect">
                                   <p:stCondLst>
                                     <p:cond delay="0"/>
                                   </p:stCondLst>
                                   <p:childTnLst>
                                     <p:set>
                                       <p:cBhvr>
-                                        <p:cTn id="11" dur="1" fill="hold">
+                                        <p:cTn id="9" dur="1" fill="hold">
                                           <p:stCondLst>
                                             <p:cond delay="0"/>
                                           </p:stCondLst>
@@ -35096,7 +35113,7 @@
                                     </p:set>
                                     <p:animEffect transition="in" filter="fade">
                                       <p:cBhvr>
-                                        <p:cTn id="12" dur="500"/>
+                                        <p:cTn id="10" dur="500"/>
                                         <p:tgtEl>
                                           <p:spTgt spid="3">
                                             <p:txEl>
@@ -35116,26 +35133,26 @@
                     </p:cTn>
                   </p:par>
                   <p:par>
-                    <p:cTn id="13" fill="hold">
+                    <p:cTn id="11" fill="hold">
                       <p:stCondLst>
                         <p:cond delay="indefinite"/>
                       </p:stCondLst>
                       <p:childTnLst>
                         <p:par>
-                          <p:cTn id="14" fill="hold">
+                          <p:cTn id="12" fill="hold">
                             <p:stCondLst>
                               <p:cond delay="0"/>
                             </p:stCondLst>
                             <p:childTnLst>
                               <p:par>
-                                <p:cTn id="15" presetID="10" presetClass="entr" presetSubtype="0" fill="hold" nodeType="clickEffect">
+                                <p:cTn id="13" presetID="10" presetClass="entr" presetSubtype="0" fill="hold" nodeType="clickEffect">
                                   <p:stCondLst>
                                     <p:cond delay="0"/>
                                   </p:stCondLst>
                                   <p:childTnLst>
                                     <p:set>
                                       <p:cBhvr>
-                                        <p:cTn id="16" dur="1" fill="hold">
+                                        <p:cTn id="14" dur="1" fill="hold">
                                           <p:stCondLst>
                                             <p:cond delay="0"/>
                                           </p:stCondLst>
@@ -35157,13 +35174,48 @@
                                     </p:set>
                                     <p:animEffect transition="in" filter="fade">
                                       <p:cBhvr>
-                                        <p:cTn id="17" dur="500"/>
+                                        <p:cTn id="15" dur="500"/>
                                         <p:tgtEl>
                                           <p:spTgt spid="3">
                                             <p:txEl>
                                               <p:pRg st="1" end="1"/>
                                             </p:txEl>
                                           </p:spTgt>
+                                        </p:tgtEl>
+                                      </p:cBhvr>
+                                    </p:animEffect>
+                                  </p:childTnLst>
+                                </p:cTn>
+                              </p:par>
+                              <p:par>
+                                <p:cTn id="16" presetID="10" presetClass="entr" presetSubtype="0" fill="hold" nodeType="withEffect">
+                                  <p:stCondLst>
+                                    <p:cond delay="0"/>
+                                  </p:stCondLst>
+                                  <p:childTnLst>
+                                    <p:set>
+                                      <p:cBhvr>
+                                        <p:cTn id="17" dur="1" fill="hold">
+                                          <p:stCondLst>
+                                            <p:cond delay="0"/>
+                                          </p:stCondLst>
+                                        </p:cTn>
+                                        <p:tgtEl>
+                                          <p:spTgt spid="8"/>
+                                        </p:tgtEl>
+                                        <p:attrNameLst>
+                                          <p:attrName>style.visibility</p:attrName>
+                                        </p:attrNameLst>
+                                      </p:cBhvr>
+                                      <p:to>
+                                        <p:strVal val="visible"/>
+                                      </p:to>
+                                    </p:set>
+                                    <p:animEffect transition="in" filter="fade">
+                                      <p:cBhvr>
+                                        <p:cTn id="18" dur="500"/>
+                                        <p:tgtEl>
+                                          <p:spTgt spid="8"/>
                                         </p:tgtEl>
                                       </p:cBhvr>
                                     </p:animEffect>
@@ -35177,32 +35229,36 @@
                     </p:cTn>
                   </p:par>
                   <p:par>
-                    <p:cTn id="18" fill="hold">
+                    <p:cTn id="19" fill="hold">
                       <p:stCondLst>
                         <p:cond delay="indefinite"/>
                       </p:stCondLst>
                       <p:childTnLst>
                         <p:par>
-                          <p:cTn id="19" fill="hold">
+                          <p:cTn id="20" fill="hold">
                             <p:stCondLst>
                               <p:cond delay="0"/>
                             </p:stCondLst>
                             <p:childTnLst>
                               <p:par>
-                                <p:cTn id="20" presetID="10" presetClass="entr" presetSubtype="0" fill="hold" nodeType="clickEffect">
+                                <p:cTn id="21" presetID="10" presetClass="entr" presetSubtype="0" fill="hold" nodeType="clickEffect">
                                   <p:stCondLst>
                                     <p:cond delay="0"/>
                                   </p:stCondLst>
                                   <p:childTnLst>
                                     <p:set>
                                       <p:cBhvr>
-                                        <p:cTn id="21" dur="1" fill="hold">
+                                        <p:cTn id="22" dur="1" fill="hold">
                                           <p:stCondLst>
                                             <p:cond delay="0"/>
                                           </p:stCondLst>
                                         </p:cTn>
                                         <p:tgtEl>
-                                          <p:spTgt spid="11"/>
+                                          <p:spTgt spid="3">
+                                            <p:txEl>
+                                              <p:pRg st="2" end="2"/>
+                                            </p:txEl>
+                                          </p:spTgt>
                                         </p:tgtEl>
                                         <p:attrNameLst>
                                           <p:attrName>style.visibility</p:attrName>
@@ -35214,48 +35270,34 @@
                                     </p:set>
                                     <p:animEffect transition="in" filter="fade">
                                       <p:cBhvr>
-                                        <p:cTn id="22" dur="500"/>
+                                        <p:cTn id="23" dur="500"/>
                                         <p:tgtEl>
-                                          <p:spTgt spid="11"/>
+                                          <p:spTgt spid="3">
+                                            <p:txEl>
+                                              <p:pRg st="2" end="2"/>
+                                            </p:txEl>
+                                          </p:spTgt>
                                         </p:tgtEl>
                                       </p:cBhvr>
                                     </p:animEffect>
                                   </p:childTnLst>
                                 </p:cTn>
                               </p:par>
-                            </p:childTnLst>
-                          </p:cTn>
-                        </p:par>
-                      </p:childTnLst>
-                    </p:cTn>
-                  </p:par>
-                  <p:par>
-                    <p:cTn id="23" fill="hold">
-                      <p:stCondLst>
-                        <p:cond delay="indefinite"/>
-                      </p:stCondLst>
-                      <p:childTnLst>
-                        <p:par>
-                          <p:cTn id="24" fill="hold">
-                            <p:stCondLst>
-                              <p:cond delay="0"/>
-                            </p:stCondLst>
-                            <p:childTnLst>
                               <p:par>
-                                <p:cTn id="25" presetID="10" presetClass="entr" presetSubtype="0" fill="hold" nodeType="clickEffect">
+                                <p:cTn id="24" presetID="10" presetClass="entr" presetSubtype="0" fill="hold" nodeType="withEffect">
                                   <p:stCondLst>
                                     <p:cond delay="0"/>
                                   </p:stCondLst>
                                   <p:childTnLst>
                                     <p:set>
                                       <p:cBhvr>
-                                        <p:cTn id="26" dur="1" fill="hold">
+                                        <p:cTn id="25" dur="1" fill="hold">
                                           <p:stCondLst>
                                             <p:cond delay="0"/>
                                           </p:stCondLst>
                                         </p:cTn>
                                         <p:tgtEl>
-                                          <p:spTgt spid="22"/>
+                                          <p:spTgt spid="12"/>
                                         </p:tgtEl>
                                         <p:attrNameLst>
                                           <p:attrName>style.visibility</p:attrName>
@@ -35267,9 +35309,9 @@
                                     </p:set>
                                     <p:animEffect transition="in" filter="fade">
                                       <p:cBhvr>
-                                        <p:cTn id="27" dur="500"/>
+                                        <p:cTn id="26" dur="500"/>
                                         <p:tgtEl>
-                                          <p:spTgt spid="22"/>
+                                          <p:spTgt spid="12"/>
                                         </p:tgtEl>
                                       </p:cBhvr>
                                     </p:animEffect>
@@ -35340,48 +35382,6 @@
       </p:grpSpPr>
       <p:sp>
         <p:nvSpPr>
-          <p:cNvPr id="3" name="Content Placeholder 2">
-            <a:extLst>
-              <a:ext uri="{FF2B5EF4-FFF2-40B4-BE49-F238E27FC236}">
-                <a16:creationId xmlns:a16="http://schemas.microsoft.com/office/drawing/2014/main" id="{891C7693-D3DF-4635-96F4-97F3B4136FDF}"/>
-              </a:ext>
-            </a:extLst>
-          </p:cNvPr>
-          <p:cNvSpPr>
-            <a:spLocks noGrp="1"/>
-          </p:cNvSpPr>
-          <p:nvPr>
-            <p:ph idx="1"/>
-          </p:nvPr>
-        </p:nvSpPr>
-        <p:spPr/>
-        <p:txBody>
-          <a:bodyPr/>
-          <a:lstStyle/>
-          <a:p>
-            <a:r>
-              <a:rPr lang="en-US" dirty="0">
-                <a:latin typeface="Euclid Circular B" panose="020B0504000000000000" pitchFamily="34" charset="0"/>
-                <a:ea typeface="Euclid Circular B" panose="020B0504000000000000" pitchFamily="34" charset="0"/>
-              </a:rPr>
-              <a:t>TODO</a:t>
-            </a:r>
-            <a:r>
-              <a:rPr lang="en-US">
-                <a:latin typeface="Euclid Circular B" panose="020B0504000000000000" pitchFamily="34" charset="0"/>
-                <a:ea typeface="Euclid Circular B" panose="020B0504000000000000" pitchFamily="34" charset="0"/>
-              </a:rPr>
-              <a:t>: ...</a:t>
-            </a:r>
-            <a:endParaRPr lang="en-US" dirty="0">
-              <a:latin typeface="Euclid Circular B" panose="020B0504000000000000" pitchFamily="34" charset="0"/>
-              <a:ea typeface="Euclid Circular B" panose="020B0504000000000000" pitchFamily="34" charset="0"/>
-            </a:endParaRPr>
-          </a:p>
-        </p:txBody>
-      </p:sp>
-      <p:sp>
-        <p:nvSpPr>
           <p:cNvPr id="6" name="Title 1">
             <a:extLst>
               <a:ext uri="{FF2B5EF4-FFF2-40B4-BE49-F238E27FC236}">
@@ -35428,14 +35428,14 @@
               </a:rPr>
             </a:br>
             <a:r>
-              <a:rPr lang="en-US" sz="3200" b="1" i="1" dirty="0" err="1">
+              <a:rPr lang="en-US" sz="3200" b="1" i="1" dirty="0">
                 <a:solidFill>
                   <a:srgbClr val="292D33"/>
                 </a:solidFill>
                 <a:latin typeface="Euclid Circular B" panose="020B0504000000000000" pitchFamily="34" charset="0"/>
                 <a:ea typeface="Euclid Circular B" panose="020B0504000000000000" pitchFamily="34" charset="0"/>
               </a:rPr>
-              <a:t>subheader</a:t>
+              <a:t>Synchronous communication: caching</a:t>
             </a:r>
             <a:endParaRPr lang="en-US" b="1" dirty="0">
               <a:solidFill>
@@ -35447,6 +35447,1365 @@
           </a:p>
         </p:txBody>
       </p:sp>
+      <p:sp>
+        <p:nvSpPr>
+          <p:cNvPr id="7" name="Rectangle 6">
+            <a:extLst>
+              <a:ext uri="{FF2B5EF4-FFF2-40B4-BE49-F238E27FC236}">
+                <a16:creationId xmlns:a16="http://schemas.microsoft.com/office/drawing/2014/main" id="{8E41FD15-E2AC-4121-803B-70F8480A4A7E}"/>
+              </a:ext>
+            </a:extLst>
+          </p:cNvPr>
+          <p:cNvSpPr/>
+          <p:nvPr/>
+        </p:nvSpPr>
+        <p:spPr>
+          <a:xfrm>
+            <a:off x="2410068" y="3429000"/>
+            <a:ext cx="7552080" cy="1902347"/>
+          </a:xfrm>
+          <a:prstGeom prst="rect">
+            <a:avLst/>
+          </a:prstGeom>
+        </p:spPr>
+        <p:style>
+          <a:lnRef idx="2">
+            <a:schemeClr val="accent6">
+              <a:shade val="50000"/>
+            </a:schemeClr>
+          </a:lnRef>
+          <a:fillRef idx="1">
+            <a:schemeClr val="accent6"/>
+          </a:fillRef>
+          <a:effectRef idx="0">
+            <a:schemeClr val="accent6"/>
+          </a:effectRef>
+          <a:fontRef idx="minor">
+            <a:schemeClr val="lt1"/>
+          </a:fontRef>
+        </p:style>
+        <p:txBody>
+          <a:bodyPr rtlCol="0" anchor="b"/>
+          <a:lstStyle/>
+          <a:p>
+            <a:r>
+              <a:rPr lang="en-US" dirty="0"/>
+              <a:t>Monolith Host (single process)</a:t>
+            </a:r>
+          </a:p>
+        </p:txBody>
+      </p:sp>
+      <p:sp>
+        <p:nvSpPr>
+          <p:cNvPr id="8" name="Rectangle 7">
+            <a:extLst>
+              <a:ext uri="{FF2B5EF4-FFF2-40B4-BE49-F238E27FC236}">
+                <a16:creationId xmlns:a16="http://schemas.microsoft.com/office/drawing/2014/main" id="{1B5E26F6-9D3F-4424-9186-BF786E797B4F}"/>
+              </a:ext>
+            </a:extLst>
+          </p:cNvPr>
+          <p:cNvSpPr/>
+          <p:nvPr/>
+        </p:nvSpPr>
+        <p:spPr>
+          <a:xfrm>
+            <a:off x="2534375" y="3532495"/>
+            <a:ext cx="914400" cy="1285041"/>
+          </a:xfrm>
+          <a:prstGeom prst="rect">
+            <a:avLst/>
+          </a:prstGeom>
+        </p:spPr>
+        <p:style>
+          <a:lnRef idx="2">
+            <a:schemeClr val="accent1">
+              <a:shade val="50000"/>
+            </a:schemeClr>
+          </a:lnRef>
+          <a:fillRef idx="1">
+            <a:schemeClr val="accent1"/>
+          </a:fillRef>
+          <a:effectRef idx="0">
+            <a:schemeClr val="accent1"/>
+          </a:effectRef>
+          <a:fontRef idx="minor">
+            <a:schemeClr val="lt1"/>
+          </a:fontRef>
+        </p:style>
+        <p:txBody>
+          <a:bodyPr rtlCol="0" anchor="ctr"/>
+          <a:lstStyle/>
+          <a:p>
+            <a:pPr algn="ctr"/>
+            <a:endParaRPr lang="en-US" dirty="0"/>
+          </a:p>
+        </p:txBody>
+      </p:sp>
+      <p:sp>
+        <p:nvSpPr>
+          <p:cNvPr id="9" name="Rectangle 8">
+            <a:extLst>
+              <a:ext uri="{FF2B5EF4-FFF2-40B4-BE49-F238E27FC236}">
+                <a16:creationId xmlns:a16="http://schemas.microsoft.com/office/drawing/2014/main" id="{12CE3DF0-716C-4EA4-8CD1-1050C7B4517C}"/>
+              </a:ext>
+            </a:extLst>
+          </p:cNvPr>
+          <p:cNvSpPr/>
+          <p:nvPr/>
+        </p:nvSpPr>
+        <p:spPr>
+          <a:xfrm>
+            <a:off x="2609790" y="4082245"/>
+            <a:ext cx="786623" cy="131976"/>
+          </a:xfrm>
+          <a:prstGeom prst="rect">
+            <a:avLst/>
+          </a:prstGeom>
+          <a:solidFill>
+            <a:schemeClr val="accent5">
+              <a:lumMod val="60000"/>
+              <a:lumOff val="40000"/>
+            </a:schemeClr>
+          </a:solidFill>
+          <a:ln>
+            <a:solidFill>
+              <a:schemeClr val="accent5">
+                <a:lumMod val="40000"/>
+                <a:lumOff val="60000"/>
+              </a:schemeClr>
+            </a:solidFill>
+          </a:ln>
+        </p:spPr>
+        <p:style>
+          <a:lnRef idx="2">
+            <a:schemeClr val="accent4">
+              <a:shade val="50000"/>
+            </a:schemeClr>
+          </a:lnRef>
+          <a:fillRef idx="1">
+            <a:schemeClr val="accent4"/>
+          </a:fillRef>
+          <a:effectRef idx="0">
+            <a:schemeClr val="accent4"/>
+          </a:effectRef>
+          <a:fontRef idx="minor">
+            <a:schemeClr val="lt1"/>
+          </a:fontRef>
+        </p:style>
+        <p:txBody>
+          <a:bodyPr rtlCol="0" anchor="ctr"/>
+          <a:lstStyle/>
+          <a:p>
+            <a:pPr algn="ctr"/>
+            <a:endParaRPr lang="en-US" dirty="0"/>
+          </a:p>
+        </p:txBody>
+      </p:sp>
+      <p:sp>
+        <p:nvSpPr>
+          <p:cNvPr id="10" name="Rectangle 9">
+            <a:extLst>
+              <a:ext uri="{FF2B5EF4-FFF2-40B4-BE49-F238E27FC236}">
+                <a16:creationId xmlns:a16="http://schemas.microsoft.com/office/drawing/2014/main" id="{DBC76DFE-8712-4435-9594-6D5C497B9235}"/>
+              </a:ext>
+            </a:extLst>
+          </p:cNvPr>
+          <p:cNvSpPr/>
+          <p:nvPr/>
+        </p:nvSpPr>
+        <p:spPr>
+          <a:xfrm>
+            <a:off x="2609790" y="4255071"/>
+            <a:ext cx="786623" cy="131976"/>
+          </a:xfrm>
+          <a:prstGeom prst="rect">
+            <a:avLst/>
+          </a:prstGeom>
+          <a:solidFill>
+            <a:schemeClr val="accent5">
+              <a:lumMod val="60000"/>
+              <a:lumOff val="40000"/>
+            </a:schemeClr>
+          </a:solidFill>
+          <a:ln>
+            <a:solidFill>
+              <a:schemeClr val="accent5">
+                <a:lumMod val="40000"/>
+                <a:lumOff val="60000"/>
+              </a:schemeClr>
+            </a:solidFill>
+          </a:ln>
+        </p:spPr>
+        <p:style>
+          <a:lnRef idx="2">
+            <a:schemeClr val="accent4">
+              <a:shade val="50000"/>
+            </a:schemeClr>
+          </a:lnRef>
+          <a:fillRef idx="1">
+            <a:schemeClr val="accent4"/>
+          </a:fillRef>
+          <a:effectRef idx="0">
+            <a:schemeClr val="accent4"/>
+          </a:effectRef>
+          <a:fontRef idx="minor">
+            <a:schemeClr val="lt1"/>
+          </a:fontRef>
+        </p:style>
+        <p:txBody>
+          <a:bodyPr rtlCol="0" anchor="ctr"/>
+          <a:lstStyle/>
+          <a:p>
+            <a:pPr algn="ctr"/>
+            <a:endParaRPr lang="en-US" dirty="0"/>
+          </a:p>
+        </p:txBody>
+      </p:sp>
+      <p:sp>
+        <p:nvSpPr>
+          <p:cNvPr id="11" name="Rectangle 10">
+            <a:extLst>
+              <a:ext uri="{FF2B5EF4-FFF2-40B4-BE49-F238E27FC236}">
+                <a16:creationId xmlns:a16="http://schemas.microsoft.com/office/drawing/2014/main" id="{9E637B45-306E-42C3-9F61-4B25016043E4}"/>
+              </a:ext>
+            </a:extLst>
+          </p:cNvPr>
+          <p:cNvSpPr/>
+          <p:nvPr/>
+        </p:nvSpPr>
+        <p:spPr>
+          <a:xfrm>
+            <a:off x="2609790" y="4427897"/>
+            <a:ext cx="786623" cy="131976"/>
+          </a:xfrm>
+          <a:prstGeom prst="rect">
+            <a:avLst/>
+          </a:prstGeom>
+          <a:solidFill>
+            <a:schemeClr val="accent5">
+              <a:lumMod val="60000"/>
+              <a:lumOff val="40000"/>
+            </a:schemeClr>
+          </a:solidFill>
+          <a:ln>
+            <a:solidFill>
+              <a:schemeClr val="accent5">
+                <a:lumMod val="40000"/>
+                <a:lumOff val="60000"/>
+              </a:schemeClr>
+            </a:solidFill>
+          </a:ln>
+        </p:spPr>
+        <p:style>
+          <a:lnRef idx="2">
+            <a:schemeClr val="accent4">
+              <a:shade val="50000"/>
+            </a:schemeClr>
+          </a:lnRef>
+          <a:fillRef idx="1">
+            <a:schemeClr val="accent4"/>
+          </a:fillRef>
+          <a:effectRef idx="0">
+            <a:schemeClr val="accent4"/>
+          </a:effectRef>
+          <a:fontRef idx="minor">
+            <a:schemeClr val="lt1"/>
+          </a:fontRef>
+        </p:style>
+        <p:txBody>
+          <a:bodyPr rtlCol="0" anchor="ctr"/>
+          <a:lstStyle/>
+          <a:p>
+            <a:pPr algn="ctr"/>
+            <a:endParaRPr lang="en-US" dirty="0"/>
+          </a:p>
+        </p:txBody>
+      </p:sp>
+      <p:sp>
+        <p:nvSpPr>
+          <p:cNvPr id="12" name="Rectangle 11">
+            <a:extLst>
+              <a:ext uri="{FF2B5EF4-FFF2-40B4-BE49-F238E27FC236}">
+                <a16:creationId xmlns:a16="http://schemas.microsoft.com/office/drawing/2014/main" id="{74CC35D2-5F98-4916-826C-3BC5E01D3628}"/>
+              </a:ext>
+            </a:extLst>
+          </p:cNvPr>
+          <p:cNvSpPr/>
+          <p:nvPr/>
+        </p:nvSpPr>
+        <p:spPr>
+          <a:xfrm>
+            <a:off x="2609790" y="4600723"/>
+            <a:ext cx="786623" cy="131976"/>
+          </a:xfrm>
+          <a:prstGeom prst="rect">
+            <a:avLst/>
+          </a:prstGeom>
+          <a:solidFill>
+            <a:schemeClr val="accent5">
+              <a:lumMod val="60000"/>
+              <a:lumOff val="40000"/>
+            </a:schemeClr>
+          </a:solidFill>
+          <a:ln>
+            <a:solidFill>
+              <a:schemeClr val="accent5">
+                <a:lumMod val="40000"/>
+                <a:lumOff val="60000"/>
+              </a:schemeClr>
+            </a:solidFill>
+          </a:ln>
+        </p:spPr>
+        <p:style>
+          <a:lnRef idx="2">
+            <a:schemeClr val="accent4">
+              <a:shade val="50000"/>
+            </a:schemeClr>
+          </a:lnRef>
+          <a:fillRef idx="1">
+            <a:schemeClr val="accent4"/>
+          </a:fillRef>
+          <a:effectRef idx="0">
+            <a:schemeClr val="accent4"/>
+          </a:effectRef>
+          <a:fontRef idx="minor">
+            <a:schemeClr val="lt1"/>
+          </a:fontRef>
+        </p:style>
+        <p:txBody>
+          <a:bodyPr rtlCol="0" anchor="ctr"/>
+          <a:lstStyle/>
+          <a:p>
+            <a:pPr algn="ctr"/>
+            <a:endParaRPr lang="en-US" dirty="0"/>
+          </a:p>
+        </p:txBody>
+      </p:sp>
+      <p:sp>
+        <p:nvSpPr>
+          <p:cNvPr id="13" name="TextBox 12">
+            <a:extLst>
+              <a:ext uri="{FF2B5EF4-FFF2-40B4-BE49-F238E27FC236}">
+                <a16:creationId xmlns:a16="http://schemas.microsoft.com/office/drawing/2014/main" id="{4E8E7315-86F4-4B0F-A43F-1074D90EB625}"/>
+              </a:ext>
+            </a:extLst>
+          </p:cNvPr>
+          <p:cNvSpPr txBox="1"/>
+          <p:nvPr/>
+        </p:nvSpPr>
+        <p:spPr>
+          <a:xfrm>
+            <a:off x="2557428" y="3510671"/>
+            <a:ext cx="838985" cy="523220"/>
+          </a:xfrm>
+          <a:prstGeom prst="rect">
+            <a:avLst/>
+          </a:prstGeom>
+          <a:noFill/>
+        </p:spPr>
+        <p:txBody>
+          <a:bodyPr wrap="square" rtlCol="0">
+            <a:spAutoFit/>
+          </a:bodyPr>
+          <a:lstStyle/>
+          <a:p>
+            <a:pPr algn="ctr"/>
+            <a:r>
+              <a:rPr lang="en-US" sz="1400" dirty="0">
+                <a:solidFill>
+                  <a:schemeClr val="bg1"/>
+                </a:solidFill>
+              </a:rPr>
+              <a:t>Order module</a:t>
+            </a:r>
+          </a:p>
+        </p:txBody>
+      </p:sp>
+      <p:sp>
+        <p:nvSpPr>
+          <p:cNvPr id="14" name="Rectangle 13">
+            <a:extLst>
+              <a:ext uri="{FF2B5EF4-FFF2-40B4-BE49-F238E27FC236}">
+                <a16:creationId xmlns:a16="http://schemas.microsoft.com/office/drawing/2014/main" id="{BD312150-507F-4D7E-A2F8-4CA8AFAC39F8}"/>
+              </a:ext>
+            </a:extLst>
+          </p:cNvPr>
+          <p:cNvSpPr/>
+          <p:nvPr/>
+        </p:nvSpPr>
+        <p:spPr>
+          <a:xfrm>
+            <a:off x="8954646" y="3532495"/>
+            <a:ext cx="914400" cy="1285041"/>
+          </a:xfrm>
+          <a:prstGeom prst="rect">
+            <a:avLst/>
+          </a:prstGeom>
+        </p:spPr>
+        <p:style>
+          <a:lnRef idx="2">
+            <a:schemeClr val="accent1">
+              <a:shade val="50000"/>
+            </a:schemeClr>
+          </a:lnRef>
+          <a:fillRef idx="1">
+            <a:schemeClr val="accent1"/>
+          </a:fillRef>
+          <a:effectRef idx="0">
+            <a:schemeClr val="accent1"/>
+          </a:effectRef>
+          <a:fontRef idx="minor">
+            <a:schemeClr val="lt1"/>
+          </a:fontRef>
+        </p:style>
+        <p:txBody>
+          <a:bodyPr rtlCol="0" anchor="ctr"/>
+          <a:lstStyle/>
+          <a:p>
+            <a:pPr algn="ctr"/>
+            <a:endParaRPr lang="en-US" dirty="0"/>
+          </a:p>
+        </p:txBody>
+      </p:sp>
+      <p:sp>
+        <p:nvSpPr>
+          <p:cNvPr id="15" name="Rectangle 14">
+            <a:extLst>
+              <a:ext uri="{FF2B5EF4-FFF2-40B4-BE49-F238E27FC236}">
+                <a16:creationId xmlns:a16="http://schemas.microsoft.com/office/drawing/2014/main" id="{102084E7-4807-4D3C-9AB7-5E9DBF2F38B1}"/>
+              </a:ext>
+            </a:extLst>
+          </p:cNvPr>
+          <p:cNvSpPr/>
+          <p:nvPr/>
+        </p:nvSpPr>
+        <p:spPr>
+          <a:xfrm>
+            <a:off x="9030061" y="4082245"/>
+            <a:ext cx="786623" cy="131976"/>
+          </a:xfrm>
+          <a:prstGeom prst="rect">
+            <a:avLst/>
+          </a:prstGeom>
+          <a:solidFill>
+            <a:schemeClr val="accent5">
+              <a:lumMod val="60000"/>
+              <a:lumOff val="40000"/>
+            </a:schemeClr>
+          </a:solidFill>
+          <a:ln>
+            <a:solidFill>
+              <a:schemeClr val="accent5">
+                <a:lumMod val="40000"/>
+                <a:lumOff val="60000"/>
+              </a:schemeClr>
+            </a:solidFill>
+          </a:ln>
+        </p:spPr>
+        <p:style>
+          <a:lnRef idx="2">
+            <a:schemeClr val="accent4">
+              <a:shade val="50000"/>
+            </a:schemeClr>
+          </a:lnRef>
+          <a:fillRef idx="1">
+            <a:schemeClr val="accent4"/>
+          </a:fillRef>
+          <a:effectRef idx="0">
+            <a:schemeClr val="accent4"/>
+          </a:effectRef>
+          <a:fontRef idx="minor">
+            <a:schemeClr val="lt1"/>
+          </a:fontRef>
+        </p:style>
+        <p:txBody>
+          <a:bodyPr rtlCol="0" anchor="ctr"/>
+          <a:lstStyle/>
+          <a:p>
+            <a:pPr algn="ctr"/>
+            <a:endParaRPr lang="en-US" dirty="0"/>
+          </a:p>
+        </p:txBody>
+      </p:sp>
+      <p:sp>
+        <p:nvSpPr>
+          <p:cNvPr id="16" name="Rectangle 15">
+            <a:extLst>
+              <a:ext uri="{FF2B5EF4-FFF2-40B4-BE49-F238E27FC236}">
+                <a16:creationId xmlns:a16="http://schemas.microsoft.com/office/drawing/2014/main" id="{320A0F64-447F-4963-BBDF-45BDE43B14C4}"/>
+              </a:ext>
+            </a:extLst>
+          </p:cNvPr>
+          <p:cNvSpPr/>
+          <p:nvPr/>
+        </p:nvSpPr>
+        <p:spPr>
+          <a:xfrm>
+            <a:off x="9030061" y="4255071"/>
+            <a:ext cx="786623" cy="131976"/>
+          </a:xfrm>
+          <a:prstGeom prst="rect">
+            <a:avLst/>
+          </a:prstGeom>
+          <a:solidFill>
+            <a:schemeClr val="accent5">
+              <a:lumMod val="60000"/>
+              <a:lumOff val="40000"/>
+            </a:schemeClr>
+          </a:solidFill>
+          <a:ln>
+            <a:solidFill>
+              <a:schemeClr val="accent5">
+                <a:lumMod val="40000"/>
+                <a:lumOff val="60000"/>
+              </a:schemeClr>
+            </a:solidFill>
+          </a:ln>
+        </p:spPr>
+        <p:style>
+          <a:lnRef idx="2">
+            <a:schemeClr val="accent4">
+              <a:shade val="50000"/>
+            </a:schemeClr>
+          </a:lnRef>
+          <a:fillRef idx="1">
+            <a:schemeClr val="accent4"/>
+          </a:fillRef>
+          <a:effectRef idx="0">
+            <a:schemeClr val="accent4"/>
+          </a:effectRef>
+          <a:fontRef idx="minor">
+            <a:schemeClr val="lt1"/>
+          </a:fontRef>
+        </p:style>
+        <p:txBody>
+          <a:bodyPr rtlCol="0" anchor="ctr"/>
+          <a:lstStyle/>
+          <a:p>
+            <a:pPr algn="ctr"/>
+            <a:endParaRPr lang="en-US" dirty="0"/>
+          </a:p>
+        </p:txBody>
+      </p:sp>
+      <p:sp>
+        <p:nvSpPr>
+          <p:cNvPr id="17" name="Rectangle 16">
+            <a:extLst>
+              <a:ext uri="{FF2B5EF4-FFF2-40B4-BE49-F238E27FC236}">
+                <a16:creationId xmlns:a16="http://schemas.microsoft.com/office/drawing/2014/main" id="{97AEE5C3-785F-4B66-9912-E10ED0FDD5BC}"/>
+              </a:ext>
+            </a:extLst>
+          </p:cNvPr>
+          <p:cNvSpPr/>
+          <p:nvPr/>
+        </p:nvSpPr>
+        <p:spPr>
+          <a:xfrm>
+            <a:off x="9030061" y="4427897"/>
+            <a:ext cx="786623" cy="131976"/>
+          </a:xfrm>
+          <a:prstGeom prst="rect">
+            <a:avLst/>
+          </a:prstGeom>
+          <a:solidFill>
+            <a:schemeClr val="accent5">
+              <a:lumMod val="60000"/>
+              <a:lumOff val="40000"/>
+            </a:schemeClr>
+          </a:solidFill>
+          <a:ln>
+            <a:solidFill>
+              <a:schemeClr val="accent5">
+                <a:lumMod val="40000"/>
+                <a:lumOff val="60000"/>
+              </a:schemeClr>
+            </a:solidFill>
+          </a:ln>
+        </p:spPr>
+        <p:style>
+          <a:lnRef idx="2">
+            <a:schemeClr val="accent4">
+              <a:shade val="50000"/>
+            </a:schemeClr>
+          </a:lnRef>
+          <a:fillRef idx="1">
+            <a:schemeClr val="accent4"/>
+          </a:fillRef>
+          <a:effectRef idx="0">
+            <a:schemeClr val="accent4"/>
+          </a:effectRef>
+          <a:fontRef idx="minor">
+            <a:schemeClr val="lt1"/>
+          </a:fontRef>
+        </p:style>
+        <p:txBody>
+          <a:bodyPr rtlCol="0" anchor="ctr"/>
+          <a:lstStyle/>
+          <a:p>
+            <a:pPr algn="ctr"/>
+            <a:endParaRPr lang="en-US" dirty="0"/>
+          </a:p>
+        </p:txBody>
+      </p:sp>
+      <p:sp>
+        <p:nvSpPr>
+          <p:cNvPr id="18" name="Rectangle 17">
+            <a:extLst>
+              <a:ext uri="{FF2B5EF4-FFF2-40B4-BE49-F238E27FC236}">
+                <a16:creationId xmlns:a16="http://schemas.microsoft.com/office/drawing/2014/main" id="{35AAB8C7-2C96-4C59-B8BA-4492AEFBD77B}"/>
+              </a:ext>
+            </a:extLst>
+          </p:cNvPr>
+          <p:cNvSpPr/>
+          <p:nvPr/>
+        </p:nvSpPr>
+        <p:spPr>
+          <a:xfrm>
+            <a:off x="9030061" y="4600723"/>
+            <a:ext cx="786623" cy="131976"/>
+          </a:xfrm>
+          <a:prstGeom prst="rect">
+            <a:avLst/>
+          </a:prstGeom>
+          <a:solidFill>
+            <a:schemeClr val="accent5">
+              <a:lumMod val="60000"/>
+              <a:lumOff val="40000"/>
+            </a:schemeClr>
+          </a:solidFill>
+          <a:ln>
+            <a:solidFill>
+              <a:schemeClr val="accent5">
+                <a:lumMod val="40000"/>
+                <a:lumOff val="60000"/>
+              </a:schemeClr>
+            </a:solidFill>
+          </a:ln>
+        </p:spPr>
+        <p:style>
+          <a:lnRef idx="2">
+            <a:schemeClr val="accent4">
+              <a:shade val="50000"/>
+            </a:schemeClr>
+          </a:lnRef>
+          <a:fillRef idx="1">
+            <a:schemeClr val="accent4"/>
+          </a:fillRef>
+          <a:effectRef idx="0">
+            <a:schemeClr val="accent4"/>
+          </a:effectRef>
+          <a:fontRef idx="minor">
+            <a:schemeClr val="lt1"/>
+          </a:fontRef>
+        </p:style>
+        <p:txBody>
+          <a:bodyPr rtlCol="0" anchor="ctr"/>
+          <a:lstStyle/>
+          <a:p>
+            <a:pPr algn="ctr"/>
+            <a:endParaRPr lang="en-US" dirty="0"/>
+          </a:p>
+        </p:txBody>
+      </p:sp>
+      <p:sp>
+        <p:nvSpPr>
+          <p:cNvPr id="19" name="TextBox 18">
+            <a:extLst>
+              <a:ext uri="{FF2B5EF4-FFF2-40B4-BE49-F238E27FC236}">
+                <a16:creationId xmlns:a16="http://schemas.microsoft.com/office/drawing/2014/main" id="{3CB2D4F0-E22C-4C28-BEE6-2215BA282ED9}"/>
+              </a:ext>
+            </a:extLst>
+          </p:cNvPr>
+          <p:cNvSpPr txBox="1"/>
+          <p:nvPr/>
+        </p:nvSpPr>
+        <p:spPr>
+          <a:xfrm>
+            <a:off x="8977699" y="3510671"/>
+            <a:ext cx="838985" cy="523220"/>
+          </a:xfrm>
+          <a:prstGeom prst="rect">
+            <a:avLst/>
+          </a:prstGeom>
+          <a:noFill/>
+        </p:spPr>
+        <p:txBody>
+          <a:bodyPr wrap="square" rtlCol="0">
+            <a:spAutoFit/>
+          </a:bodyPr>
+          <a:lstStyle/>
+          <a:p>
+            <a:pPr algn="ctr"/>
+            <a:r>
+              <a:rPr lang="en-US" sz="1200" dirty="0">
+                <a:solidFill>
+                  <a:schemeClr val="bg1"/>
+                </a:solidFill>
+              </a:rPr>
+              <a:t>Customer</a:t>
+            </a:r>
+            <a:r>
+              <a:rPr lang="en-US" sz="1400" dirty="0">
+                <a:solidFill>
+                  <a:schemeClr val="bg1"/>
+                </a:solidFill>
+              </a:rPr>
+              <a:t> module</a:t>
+            </a:r>
+          </a:p>
+        </p:txBody>
+      </p:sp>
+      <p:pic>
+        <p:nvPicPr>
+          <p:cNvPr id="20" name="Picture 2" descr="Free photo Computer Network Technology Icon Database - Max Pixel">
+            <a:extLst>
+              <a:ext uri="{FF2B5EF4-FFF2-40B4-BE49-F238E27FC236}">
+                <a16:creationId xmlns:a16="http://schemas.microsoft.com/office/drawing/2014/main" id="{8540A6EA-BBFE-474C-B85F-81FE71498D91}"/>
+              </a:ext>
+            </a:extLst>
+          </p:cNvPr>
+          <p:cNvPicPr>
+            <a:picLocks noChangeAspect="1" noChangeArrowheads="1"/>
+          </p:cNvPicPr>
+          <p:nvPr/>
+        </p:nvPicPr>
+        <p:blipFill>
+          <a:blip r:embed="rId3">
+            <a:extLst>
+              <a:ext uri="{28A0092B-C50C-407E-A947-70E740481C1C}">
+                <a14:useLocalDpi xmlns:a14="http://schemas.microsoft.com/office/drawing/2010/main" val="0"/>
+              </a:ext>
+            </a:extLst>
+          </a:blip>
+          <a:srcRect/>
+          <a:stretch>
+            <a:fillRect/>
+          </a:stretch>
+        </p:blipFill>
+        <p:spPr bwMode="auto">
+          <a:xfrm>
+            <a:off x="9174955" y="2547965"/>
+            <a:ext cx="431128" cy="441435"/>
+          </a:xfrm>
+          <a:prstGeom prst="rect">
+            <a:avLst/>
+          </a:prstGeom>
+          <a:noFill/>
+          <a:extLst>
+            <a:ext uri="{909E8E84-426E-40DD-AFC4-6F175D3DCCD1}">
+              <a14:hiddenFill xmlns:a14="http://schemas.microsoft.com/office/drawing/2010/main">
+                <a:solidFill>
+                  <a:srgbClr val="FFFFFF"/>
+                </a:solidFill>
+              </a14:hiddenFill>
+            </a:ext>
+          </a:extLst>
+        </p:spPr>
+      </p:pic>
+      <p:cxnSp>
+        <p:nvCxnSpPr>
+          <p:cNvPr id="21" name="Straight Arrow Connector 20">
+            <a:extLst>
+              <a:ext uri="{FF2B5EF4-FFF2-40B4-BE49-F238E27FC236}">
+                <a16:creationId xmlns:a16="http://schemas.microsoft.com/office/drawing/2014/main" id="{C0E767F7-1E5B-4723-8586-31DFED6E37F5}"/>
+              </a:ext>
+            </a:extLst>
+          </p:cNvPr>
+          <p:cNvCxnSpPr>
+            <a:cxnSpLocks/>
+            <a:stCxn id="19" idx="0"/>
+            <a:endCxn id="20" idx="2"/>
+          </p:cNvCxnSpPr>
+          <p:nvPr/>
+        </p:nvCxnSpPr>
+        <p:spPr>
+          <a:xfrm flipH="1" flipV="1">
+            <a:off x="9390519" y="2989400"/>
+            <a:ext cx="6673" cy="521271"/>
+          </a:xfrm>
+          <a:prstGeom prst="straightConnector1">
+            <a:avLst/>
+          </a:prstGeom>
+          <a:ln w="25400">
+            <a:solidFill>
+              <a:schemeClr val="tx1"/>
+            </a:solidFill>
+            <a:tailEnd type="triangle"/>
+          </a:ln>
+        </p:spPr>
+        <p:style>
+          <a:lnRef idx="1">
+            <a:schemeClr val="accent1"/>
+          </a:lnRef>
+          <a:fillRef idx="0">
+            <a:schemeClr val="accent1"/>
+          </a:fillRef>
+          <a:effectRef idx="0">
+            <a:schemeClr val="accent1"/>
+          </a:effectRef>
+          <a:fontRef idx="minor">
+            <a:schemeClr val="tx1"/>
+          </a:fontRef>
+        </p:style>
+      </p:cxnSp>
+      <p:pic>
+        <p:nvPicPr>
+          <p:cNvPr id="22" name="Picture 2" descr="Free photo Computer Network Technology Icon Database - Max Pixel">
+            <a:extLst>
+              <a:ext uri="{FF2B5EF4-FFF2-40B4-BE49-F238E27FC236}">
+                <a16:creationId xmlns:a16="http://schemas.microsoft.com/office/drawing/2014/main" id="{F0E0F68F-1686-4BD5-8DF7-B47D6B65001F}"/>
+              </a:ext>
+            </a:extLst>
+          </p:cNvPr>
+          <p:cNvPicPr>
+            <a:picLocks noChangeAspect="1" noChangeArrowheads="1"/>
+          </p:cNvPicPr>
+          <p:nvPr/>
+        </p:nvPicPr>
+        <p:blipFill>
+          <a:blip r:embed="rId3">
+            <a:extLst>
+              <a:ext uri="{28A0092B-C50C-407E-A947-70E740481C1C}">
+                <a14:useLocalDpi xmlns:a14="http://schemas.microsoft.com/office/drawing/2010/main" val="0"/>
+              </a:ext>
+            </a:extLst>
+          </a:blip>
+          <a:srcRect/>
+          <a:stretch>
+            <a:fillRect/>
+          </a:stretch>
+        </p:blipFill>
+        <p:spPr bwMode="auto">
+          <a:xfrm>
+            <a:off x="2752920" y="2546131"/>
+            <a:ext cx="431128" cy="441435"/>
+          </a:xfrm>
+          <a:prstGeom prst="rect">
+            <a:avLst/>
+          </a:prstGeom>
+          <a:noFill/>
+          <a:extLst>
+            <a:ext uri="{909E8E84-426E-40DD-AFC4-6F175D3DCCD1}">
+              <a14:hiddenFill xmlns:a14="http://schemas.microsoft.com/office/drawing/2010/main">
+                <a:solidFill>
+                  <a:srgbClr val="FFFFFF"/>
+                </a:solidFill>
+              </a14:hiddenFill>
+            </a:ext>
+          </a:extLst>
+        </p:spPr>
+      </p:pic>
+      <p:cxnSp>
+        <p:nvCxnSpPr>
+          <p:cNvPr id="23" name="Straight Arrow Connector 22">
+            <a:extLst>
+              <a:ext uri="{FF2B5EF4-FFF2-40B4-BE49-F238E27FC236}">
+                <a16:creationId xmlns:a16="http://schemas.microsoft.com/office/drawing/2014/main" id="{2EC77C7A-7941-4D1E-8029-83591138ADE9}"/>
+              </a:ext>
+            </a:extLst>
+          </p:cNvPr>
+          <p:cNvCxnSpPr>
+            <a:cxnSpLocks/>
+            <a:stCxn id="13" idx="0"/>
+            <a:endCxn id="22" idx="2"/>
+          </p:cNvCxnSpPr>
+          <p:nvPr/>
+        </p:nvCxnSpPr>
+        <p:spPr>
+          <a:xfrm flipH="1" flipV="1">
+            <a:off x="2968484" y="2987566"/>
+            <a:ext cx="8437" cy="523105"/>
+          </a:xfrm>
+          <a:prstGeom prst="straightConnector1">
+            <a:avLst/>
+          </a:prstGeom>
+          <a:ln w="25400">
+            <a:solidFill>
+              <a:schemeClr val="tx1"/>
+            </a:solidFill>
+            <a:tailEnd type="triangle"/>
+          </a:ln>
+        </p:spPr>
+        <p:style>
+          <a:lnRef idx="1">
+            <a:schemeClr val="accent1"/>
+          </a:lnRef>
+          <a:fillRef idx="0">
+            <a:schemeClr val="accent1"/>
+          </a:fillRef>
+          <a:effectRef idx="0">
+            <a:schemeClr val="accent1"/>
+          </a:effectRef>
+          <a:fontRef idx="minor">
+            <a:schemeClr val="tx1"/>
+          </a:fontRef>
+        </p:style>
+      </p:cxnSp>
+      <p:cxnSp>
+        <p:nvCxnSpPr>
+          <p:cNvPr id="24" name="Straight Arrow Connector 23">
+            <a:extLst>
+              <a:ext uri="{FF2B5EF4-FFF2-40B4-BE49-F238E27FC236}">
+                <a16:creationId xmlns:a16="http://schemas.microsoft.com/office/drawing/2014/main" id="{19D10841-599D-4D75-AD2B-886D89AE04A4}"/>
+              </a:ext>
+            </a:extLst>
+          </p:cNvPr>
+          <p:cNvCxnSpPr>
+            <a:cxnSpLocks/>
+            <a:stCxn id="8" idx="3"/>
+            <a:endCxn id="27" idx="1"/>
+          </p:cNvCxnSpPr>
+          <p:nvPr/>
+        </p:nvCxnSpPr>
+        <p:spPr>
+          <a:xfrm flipV="1">
+            <a:off x="3448775" y="4163764"/>
+            <a:ext cx="1631345" cy="11252"/>
+          </a:xfrm>
+          <a:prstGeom prst="straightConnector1">
+            <a:avLst/>
+          </a:prstGeom>
+          <a:ln w="25400">
+            <a:solidFill>
+              <a:schemeClr val="tx1"/>
+            </a:solidFill>
+            <a:tailEnd type="triangle"/>
+          </a:ln>
+        </p:spPr>
+        <p:style>
+          <a:lnRef idx="1">
+            <a:schemeClr val="accent1"/>
+          </a:lnRef>
+          <a:fillRef idx="0">
+            <a:schemeClr val="accent1"/>
+          </a:fillRef>
+          <a:effectRef idx="0">
+            <a:schemeClr val="accent1"/>
+          </a:effectRef>
+          <a:fontRef idx="minor">
+            <a:schemeClr val="tx1"/>
+          </a:fontRef>
+        </p:style>
+      </p:cxnSp>
+      <p:sp>
+        <p:nvSpPr>
+          <p:cNvPr id="25" name="TextBox 24">
+            <a:extLst>
+              <a:ext uri="{FF2B5EF4-FFF2-40B4-BE49-F238E27FC236}">
+                <a16:creationId xmlns:a16="http://schemas.microsoft.com/office/drawing/2014/main" id="{91EC2945-C788-46E3-8641-AD4B056F6E84}"/>
+              </a:ext>
+            </a:extLst>
+          </p:cNvPr>
+          <p:cNvSpPr txBox="1"/>
+          <p:nvPr/>
+        </p:nvSpPr>
+        <p:spPr>
+          <a:xfrm>
+            <a:off x="3496533" y="3824677"/>
+            <a:ext cx="1531125" cy="338554"/>
+          </a:xfrm>
+          <a:prstGeom prst="rect">
+            <a:avLst/>
+          </a:prstGeom>
+          <a:noFill/>
+        </p:spPr>
+        <p:txBody>
+          <a:bodyPr wrap="none" rtlCol="0">
+            <a:spAutoFit/>
+          </a:bodyPr>
+          <a:lstStyle/>
+          <a:p>
+            <a:r>
+              <a:rPr lang="en-US" sz="1600" dirty="0"/>
+              <a:t>Query customer</a:t>
+            </a:r>
+          </a:p>
+        </p:txBody>
+      </p:sp>
+      <p:sp>
+        <p:nvSpPr>
+          <p:cNvPr id="27" name="Rectangle 26">
+            <a:extLst>
+              <a:ext uri="{FF2B5EF4-FFF2-40B4-BE49-F238E27FC236}">
+                <a16:creationId xmlns:a16="http://schemas.microsoft.com/office/drawing/2014/main" id="{8E3BC9D8-B263-431C-9B08-99E1C45E29C0}"/>
+              </a:ext>
+            </a:extLst>
+          </p:cNvPr>
+          <p:cNvSpPr/>
+          <p:nvPr/>
+        </p:nvSpPr>
+        <p:spPr>
+          <a:xfrm>
+            <a:off x="5080120" y="3862154"/>
+            <a:ext cx="1901007" cy="603220"/>
+          </a:xfrm>
+          <a:prstGeom prst="rect">
+            <a:avLst/>
+          </a:prstGeom>
+        </p:spPr>
+        <p:style>
+          <a:lnRef idx="2">
+            <a:schemeClr val="accent4">
+              <a:shade val="50000"/>
+            </a:schemeClr>
+          </a:lnRef>
+          <a:fillRef idx="1">
+            <a:schemeClr val="accent4"/>
+          </a:fillRef>
+          <a:effectRef idx="0">
+            <a:schemeClr val="accent4"/>
+          </a:effectRef>
+          <a:fontRef idx="minor">
+            <a:schemeClr val="lt1"/>
+          </a:fontRef>
+        </p:style>
+        <p:txBody>
+          <a:bodyPr rtlCol="0" anchor="ctr"/>
+          <a:lstStyle/>
+          <a:p>
+            <a:pPr algn="ctr"/>
+            <a:r>
+              <a:rPr lang="en-US" dirty="0">
+                <a:solidFill>
+                  <a:schemeClr val="tx1"/>
+                </a:solidFill>
+              </a:rPr>
+              <a:t>Distributed cache</a:t>
+            </a:r>
+          </a:p>
+        </p:txBody>
+      </p:sp>
+      <p:cxnSp>
+        <p:nvCxnSpPr>
+          <p:cNvPr id="29" name="Straight Arrow Connector 28">
+            <a:extLst>
+              <a:ext uri="{FF2B5EF4-FFF2-40B4-BE49-F238E27FC236}">
+                <a16:creationId xmlns:a16="http://schemas.microsoft.com/office/drawing/2014/main" id="{58CABE5B-58B2-41F8-A326-D2AA1E218788}"/>
+              </a:ext>
+            </a:extLst>
+          </p:cNvPr>
+          <p:cNvCxnSpPr>
+            <a:cxnSpLocks/>
+            <a:stCxn id="27" idx="3"/>
+            <a:endCxn id="14" idx="1"/>
+          </p:cNvCxnSpPr>
+          <p:nvPr/>
+        </p:nvCxnSpPr>
+        <p:spPr>
+          <a:xfrm>
+            <a:off x="6981127" y="4163764"/>
+            <a:ext cx="1973519" cy="11252"/>
+          </a:xfrm>
+          <a:prstGeom prst="straightConnector1">
+            <a:avLst/>
+          </a:prstGeom>
+          <a:ln w="25400">
+            <a:solidFill>
+              <a:schemeClr val="tx1"/>
+            </a:solidFill>
+            <a:prstDash val="sysDash"/>
+            <a:tailEnd type="triangle"/>
+          </a:ln>
+        </p:spPr>
+        <p:style>
+          <a:lnRef idx="1">
+            <a:schemeClr val="accent1"/>
+          </a:lnRef>
+          <a:fillRef idx="0">
+            <a:schemeClr val="accent1"/>
+          </a:fillRef>
+          <a:effectRef idx="0">
+            <a:schemeClr val="accent1"/>
+          </a:effectRef>
+          <a:fontRef idx="minor">
+            <a:schemeClr val="tx1"/>
+          </a:fontRef>
+        </p:style>
+      </p:cxnSp>
+      <p:sp>
+        <p:nvSpPr>
+          <p:cNvPr id="32" name="TextBox 31">
+            <a:extLst>
+              <a:ext uri="{FF2B5EF4-FFF2-40B4-BE49-F238E27FC236}">
+                <a16:creationId xmlns:a16="http://schemas.microsoft.com/office/drawing/2014/main" id="{745B64D9-9D90-4AC6-A94B-E9D015A9C2C0}"/>
+              </a:ext>
+            </a:extLst>
+          </p:cNvPr>
+          <p:cNvSpPr txBox="1"/>
+          <p:nvPr/>
+        </p:nvSpPr>
+        <p:spPr>
+          <a:xfrm>
+            <a:off x="7049387" y="3838919"/>
+            <a:ext cx="1846531" cy="307777"/>
+          </a:xfrm>
+          <a:prstGeom prst="rect">
+            <a:avLst/>
+          </a:prstGeom>
+          <a:noFill/>
+        </p:spPr>
+        <p:txBody>
+          <a:bodyPr wrap="none" rtlCol="0">
+            <a:spAutoFit/>
+          </a:bodyPr>
+          <a:lstStyle/>
+          <a:p>
+            <a:r>
+              <a:rPr lang="en-US" sz="1400" dirty="0"/>
+              <a:t>Not found in the cache</a:t>
+            </a:r>
+          </a:p>
+        </p:txBody>
+      </p:sp>
+      <p:cxnSp>
+        <p:nvCxnSpPr>
+          <p:cNvPr id="35" name="Connector: Elbow 34">
+            <a:extLst>
+              <a:ext uri="{FF2B5EF4-FFF2-40B4-BE49-F238E27FC236}">
+                <a16:creationId xmlns:a16="http://schemas.microsoft.com/office/drawing/2014/main" id="{B7B449AC-33F0-4AEE-99BC-BD05E82562DD}"/>
+              </a:ext>
+            </a:extLst>
+          </p:cNvPr>
+          <p:cNvCxnSpPr>
+            <a:stCxn id="27" idx="2"/>
+          </p:cNvCxnSpPr>
+          <p:nvPr/>
+        </p:nvCxnSpPr>
+        <p:spPr>
+          <a:xfrm rot="5400000">
+            <a:off x="4650424" y="3234416"/>
+            <a:ext cx="149242" cy="2611158"/>
+          </a:xfrm>
+          <a:prstGeom prst="bentConnector2">
+            <a:avLst/>
+          </a:prstGeom>
+          <a:ln w="25400">
+            <a:solidFill>
+              <a:schemeClr val="tx1"/>
+            </a:solidFill>
+            <a:prstDash val="sysDash"/>
+            <a:tailEnd type="triangle"/>
+          </a:ln>
+        </p:spPr>
+        <p:style>
+          <a:lnRef idx="1">
+            <a:schemeClr val="accent1"/>
+          </a:lnRef>
+          <a:fillRef idx="0">
+            <a:schemeClr val="accent1"/>
+          </a:fillRef>
+          <a:effectRef idx="0">
+            <a:schemeClr val="accent1"/>
+          </a:effectRef>
+          <a:fontRef idx="minor">
+            <a:schemeClr val="tx1"/>
+          </a:fontRef>
+        </p:style>
+      </p:cxnSp>
+      <p:sp>
+        <p:nvSpPr>
+          <p:cNvPr id="36" name="TextBox 35">
+            <a:extLst>
+              <a:ext uri="{FF2B5EF4-FFF2-40B4-BE49-F238E27FC236}">
+                <a16:creationId xmlns:a16="http://schemas.microsoft.com/office/drawing/2014/main" id="{A98CC1EB-A5FF-46CD-8855-DB3221CC7ED8}"/>
+              </a:ext>
+            </a:extLst>
+          </p:cNvPr>
+          <p:cNvSpPr txBox="1"/>
+          <p:nvPr/>
+        </p:nvSpPr>
+        <p:spPr>
+          <a:xfrm>
+            <a:off x="3959101" y="4626854"/>
+            <a:ext cx="1564146" cy="307777"/>
+          </a:xfrm>
+          <a:prstGeom prst="rect">
+            <a:avLst/>
+          </a:prstGeom>
+          <a:noFill/>
+        </p:spPr>
+        <p:txBody>
+          <a:bodyPr wrap="none" rtlCol="0">
+            <a:spAutoFit/>
+          </a:bodyPr>
+          <a:lstStyle/>
+          <a:p>
+            <a:r>
+              <a:rPr lang="en-US" sz="1400" dirty="0"/>
+              <a:t>Found in the cache</a:t>
+            </a:r>
+          </a:p>
+        </p:txBody>
+      </p:sp>
+      <p:cxnSp>
+        <p:nvCxnSpPr>
+          <p:cNvPr id="40" name="Connector: Elbow 39">
+            <a:extLst>
+              <a:ext uri="{FF2B5EF4-FFF2-40B4-BE49-F238E27FC236}">
+                <a16:creationId xmlns:a16="http://schemas.microsoft.com/office/drawing/2014/main" id="{8A099709-0774-413A-BA81-20EAC056B388}"/>
+              </a:ext>
+            </a:extLst>
+          </p:cNvPr>
+          <p:cNvCxnSpPr>
+            <a:cxnSpLocks/>
+          </p:cNvCxnSpPr>
+          <p:nvPr/>
+        </p:nvCxnSpPr>
+        <p:spPr>
+          <a:xfrm rot="10800000">
+            <a:off x="6506679" y="4465375"/>
+            <a:ext cx="2438342" cy="267325"/>
+          </a:xfrm>
+          <a:prstGeom prst="bentConnector3">
+            <a:avLst>
+              <a:gd name="adj1" fmla="val 99738"/>
+            </a:avLst>
+          </a:prstGeom>
+          <a:ln w="25400">
+            <a:solidFill>
+              <a:srgbClr val="FFFF00"/>
+            </a:solidFill>
+            <a:prstDash val="sysDash"/>
+            <a:tailEnd type="triangle"/>
+          </a:ln>
+        </p:spPr>
+        <p:style>
+          <a:lnRef idx="1">
+            <a:schemeClr val="accent1"/>
+          </a:lnRef>
+          <a:fillRef idx="0">
+            <a:schemeClr val="accent1"/>
+          </a:fillRef>
+          <a:effectRef idx="0">
+            <a:schemeClr val="accent1"/>
+          </a:effectRef>
+          <a:fontRef idx="minor">
+            <a:schemeClr val="tx1"/>
+          </a:fontRef>
+        </p:style>
+      </p:cxnSp>
+      <p:sp>
+        <p:nvSpPr>
+          <p:cNvPr id="43" name="TextBox 42">
+            <a:extLst>
+              <a:ext uri="{FF2B5EF4-FFF2-40B4-BE49-F238E27FC236}">
+                <a16:creationId xmlns:a16="http://schemas.microsoft.com/office/drawing/2014/main" id="{CD128698-AB55-46C3-863C-08665777FC2A}"/>
+              </a:ext>
+            </a:extLst>
+          </p:cNvPr>
+          <p:cNvSpPr txBox="1"/>
+          <p:nvPr/>
+        </p:nvSpPr>
+        <p:spPr>
+          <a:xfrm>
+            <a:off x="6981127" y="4432407"/>
+            <a:ext cx="1643976" cy="307777"/>
+          </a:xfrm>
+          <a:prstGeom prst="rect">
+            <a:avLst/>
+          </a:prstGeom>
+          <a:noFill/>
+        </p:spPr>
+        <p:txBody>
+          <a:bodyPr wrap="none" rtlCol="0">
+            <a:spAutoFit/>
+          </a:bodyPr>
+          <a:lstStyle/>
+          <a:p>
+            <a:r>
+              <a:rPr lang="en-US" sz="1400" dirty="0">
+                <a:solidFill>
+                  <a:srgbClr val="FFFF00"/>
+                </a:solidFill>
+              </a:rPr>
+              <a:t>Invalidate the cache</a:t>
+            </a:r>
+          </a:p>
+        </p:txBody>
+      </p:sp>
+      <p:pic>
+        <p:nvPicPr>
+          <p:cNvPr id="45" name="Picture 44" descr="A picture containing text, clipart&#10;&#10;Description automatically generated">
+            <a:extLst>
+              <a:ext uri="{FF2B5EF4-FFF2-40B4-BE49-F238E27FC236}">
+                <a16:creationId xmlns:a16="http://schemas.microsoft.com/office/drawing/2014/main" id="{092EC8A2-3A6B-4F2F-B785-F36EC736DC53}"/>
+              </a:ext>
+            </a:extLst>
+          </p:cNvPr>
+          <p:cNvPicPr>
+            <a:picLocks noChangeAspect="1"/>
+          </p:cNvPicPr>
+          <p:nvPr/>
+        </p:nvPicPr>
+        <p:blipFill>
+          <a:blip r:embed="rId4">
+            <a:extLst>
+              <a:ext uri="{28A0092B-C50C-407E-A947-70E740481C1C}">
+                <a14:useLocalDpi xmlns:a14="http://schemas.microsoft.com/office/drawing/2010/main" val="0"/>
+              </a:ext>
+            </a:extLst>
+          </a:blip>
+          <a:stretch>
+            <a:fillRect/>
+          </a:stretch>
+        </p:blipFill>
+        <p:spPr>
+          <a:xfrm>
+            <a:off x="5300509" y="2165001"/>
+            <a:ext cx="1460227" cy="486742"/>
+          </a:xfrm>
+          <a:prstGeom prst="rect">
+            <a:avLst/>
+          </a:prstGeom>
+        </p:spPr>
+      </p:pic>
+      <p:cxnSp>
+        <p:nvCxnSpPr>
+          <p:cNvPr id="47" name="Straight Arrow Connector 46">
+            <a:extLst>
+              <a:ext uri="{FF2B5EF4-FFF2-40B4-BE49-F238E27FC236}">
+                <a16:creationId xmlns:a16="http://schemas.microsoft.com/office/drawing/2014/main" id="{74568000-4C84-4F8B-8A5E-907244CDC7FF}"/>
+              </a:ext>
+            </a:extLst>
+          </p:cNvPr>
+          <p:cNvCxnSpPr>
+            <a:cxnSpLocks/>
+            <a:stCxn id="27" idx="0"/>
+            <a:endCxn id="45" idx="2"/>
+          </p:cNvCxnSpPr>
+          <p:nvPr/>
+        </p:nvCxnSpPr>
+        <p:spPr>
+          <a:xfrm flipH="1" flipV="1">
+            <a:off x="6030623" y="2651743"/>
+            <a:ext cx="1" cy="1210411"/>
+          </a:xfrm>
+          <a:prstGeom prst="straightConnector1">
+            <a:avLst/>
+          </a:prstGeom>
+          <a:ln w="38100">
+            <a:solidFill>
+              <a:srgbClr val="FF0000"/>
+            </a:solidFill>
+            <a:prstDash val="sysDash"/>
+            <a:tailEnd type="triangle"/>
+          </a:ln>
+        </p:spPr>
+        <p:style>
+          <a:lnRef idx="1">
+            <a:schemeClr val="accent1"/>
+          </a:lnRef>
+          <a:fillRef idx="0">
+            <a:schemeClr val="accent1"/>
+          </a:fillRef>
+          <a:effectRef idx="0">
+            <a:schemeClr val="accent1"/>
+          </a:effectRef>
+          <a:fontRef idx="minor">
+            <a:schemeClr val="tx1"/>
+          </a:fontRef>
+        </p:style>
+      </p:cxnSp>
     </p:spTree>
     <p:extLst>
       <p:ext uri="{BB962C8B-B14F-4D97-AF65-F5344CB8AC3E}">
@@ -35457,6 +36816,482 @@
   <p:clrMapOvr>
     <a:masterClrMapping/>
   </p:clrMapOvr>
+  <p:timing>
+    <p:tnLst>
+      <p:par>
+        <p:cTn id="1" dur="indefinite" restart="never" nodeType="tmRoot">
+          <p:childTnLst>
+            <p:seq concurrent="1" nextAc="seek">
+              <p:cTn id="2" dur="indefinite" nodeType="mainSeq">
+                <p:childTnLst>
+                  <p:par>
+                    <p:cTn id="3" fill="hold">
+                      <p:stCondLst>
+                        <p:cond delay="indefinite"/>
+                      </p:stCondLst>
+                      <p:childTnLst>
+                        <p:par>
+                          <p:cTn id="4" fill="hold">
+                            <p:stCondLst>
+                              <p:cond delay="0"/>
+                            </p:stCondLst>
+                            <p:childTnLst>
+                              <p:par>
+                                <p:cTn id="5" presetID="10" presetClass="entr" presetSubtype="0" fill="hold" nodeType="clickEffect">
+                                  <p:stCondLst>
+                                    <p:cond delay="0"/>
+                                  </p:stCondLst>
+                                  <p:childTnLst>
+                                    <p:set>
+                                      <p:cBhvr>
+                                        <p:cTn id="6" dur="1" fill="hold">
+                                          <p:stCondLst>
+                                            <p:cond delay="0"/>
+                                          </p:stCondLst>
+                                        </p:cTn>
+                                        <p:tgtEl>
+                                          <p:spTgt spid="24"/>
+                                        </p:tgtEl>
+                                        <p:attrNameLst>
+                                          <p:attrName>style.visibility</p:attrName>
+                                        </p:attrNameLst>
+                                      </p:cBhvr>
+                                      <p:to>
+                                        <p:strVal val="visible"/>
+                                      </p:to>
+                                    </p:set>
+                                    <p:animEffect transition="in" filter="fade">
+                                      <p:cBhvr>
+                                        <p:cTn id="7" dur="500"/>
+                                        <p:tgtEl>
+                                          <p:spTgt spid="24"/>
+                                        </p:tgtEl>
+                                      </p:cBhvr>
+                                    </p:animEffect>
+                                  </p:childTnLst>
+                                </p:cTn>
+                              </p:par>
+                              <p:par>
+                                <p:cTn id="8" presetID="10" presetClass="entr" presetSubtype="0" fill="hold" grpId="0" nodeType="withEffect">
+                                  <p:stCondLst>
+                                    <p:cond delay="0"/>
+                                  </p:stCondLst>
+                                  <p:childTnLst>
+                                    <p:set>
+                                      <p:cBhvr>
+                                        <p:cTn id="9" dur="1" fill="hold">
+                                          <p:stCondLst>
+                                            <p:cond delay="0"/>
+                                          </p:stCondLst>
+                                        </p:cTn>
+                                        <p:tgtEl>
+                                          <p:spTgt spid="25"/>
+                                        </p:tgtEl>
+                                        <p:attrNameLst>
+                                          <p:attrName>style.visibility</p:attrName>
+                                        </p:attrNameLst>
+                                      </p:cBhvr>
+                                      <p:to>
+                                        <p:strVal val="visible"/>
+                                      </p:to>
+                                    </p:set>
+                                    <p:animEffect transition="in" filter="fade">
+                                      <p:cBhvr>
+                                        <p:cTn id="10" dur="500"/>
+                                        <p:tgtEl>
+                                          <p:spTgt spid="25"/>
+                                        </p:tgtEl>
+                                      </p:cBhvr>
+                                    </p:animEffect>
+                                  </p:childTnLst>
+                                </p:cTn>
+                              </p:par>
+                            </p:childTnLst>
+                          </p:cTn>
+                        </p:par>
+                      </p:childTnLst>
+                    </p:cTn>
+                  </p:par>
+                  <p:par>
+                    <p:cTn id="11" fill="hold">
+                      <p:stCondLst>
+                        <p:cond delay="indefinite"/>
+                      </p:stCondLst>
+                      <p:childTnLst>
+                        <p:par>
+                          <p:cTn id="12" fill="hold">
+                            <p:stCondLst>
+                              <p:cond delay="0"/>
+                            </p:stCondLst>
+                            <p:childTnLst>
+                              <p:par>
+                                <p:cTn id="13" presetID="10" presetClass="entr" presetSubtype="0" fill="hold" nodeType="clickEffect">
+                                  <p:stCondLst>
+                                    <p:cond delay="0"/>
+                                  </p:stCondLst>
+                                  <p:childTnLst>
+                                    <p:set>
+                                      <p:cBhvr>
+                                        <p:cTn id="14" dur="1" fill="hold">
+                                          <p:stCondLst>
+                                            <p:cond delay="0"/>
+                                          </p:stCondLst>
+                                        </p:cTn>
+                                        <p:tgtEl>
+                                          <p:spTgt spid="29"/>
+                                        </p:tgtEl>
+                                        <p:attrNameLst>
+                                          <p:attrName>style.visibility</p:attrName>
+                                        </p:attrNameLst>
+                                      </p:cBhvr>
+                                      <p:to>
+                                        <p:strVal val="visible"/>
+                                      </p:to>
+                                    </p:set>
+                                    <p:animEffect transition="in" filter="fade">
+                                      <p:cBhvr>
+                                        <p:cTn id="15" dur="500"/>
+                                        <p:tgtEl>
+                                          <p:spTgt spid="29"/>
+                                        </p:tgtEl>
+                                      </p:cBhvr>
+                                    </p:animEffect>
+                                  </p:childTnLst>
+                                </p:cTn>
+                              </p:par>
+                              <p:par>
+                                <p:cTn id="16" presetID="10" presetClass="entr" presetSubtype="0" fill="hold" grpId="0" nodeType="withEffect">
+                                  <p:stCondLst>
+                                    <p:cond delay="0"/>
+                                  </p:stCondLst>
+                                  <p:childTnLst>
+                                    <p:set>
+                                      <p:cBhvr>
+                                        <p:cTn id="17" dur="1" fill="hold">
+                                          <p:stCondLst>
+                                            <p:cond delay="0"/>
+                                          </p:stCondLst>
+                                        </p:cTn>
+                                        <p:tgtEl>
+                                          <p:spTgt spid="32"/>
+                                        </p:tgtEl>
+                                        <p:attrNameLst>
+                                          <p:attrName>style.visibility</p:attrName>
+                                        </p:attrNameLst>
+                                      </p:cBhvr>
+                                      <p:to>
+                                        <p:strVal val="visible"/>
+                                      </p:to>
+                                    </p:set>
+                                    <p:animEffect transition="in" filter="fade">
+                                      <p:cBhvr>
+                                        <p:cTn id="18" dur="500"/>
+                                        <p:tgtEl>
+                                          <p:spTgt spid="32"/>
+                                        </p:tgtEl>
+                                      </p:cBhvr>
+                                    </p:animEffect>
+                                  </p:childTnLst>
+                                </p:cTn>
+                              </p:par>
+                            </p:childTnLst>
+                          </p:cTn>
+                        </p:par>
+                      </p:childTnLst>
+                    </p:cTn>
+                  </p:par>
+                  <p:par>
+                    <p:cTn id="19" fill="hold">
+                      <p:stCondLst>
+                        <p:cond delay="indefinite"/>
+                      </p:stCondLst>
+                      <p:childTnLst>
+                        <p:par>
+                          <p:cTn id="20" fill="hold">
+                            <p:stCondLst>
+                              <p:cond delay="0"/>
+                            </p:stCondLst>
+                            <p:childTnLst>
+                              <p:par>
+                                <p:cTn id="21" presetID="10" presetClass="entr" presetSubtype="0" fill="hold" grpId="0" nodeType="clickEffect">
+                                  <p:stCondLst>
+                                    <p:cond delay="0"/>
+                                  </p:stCondLst>
+                                  <p:childTnLst>
+                                    <p:set>
+                                      <p:cBhvr>
+                                        <p:cTn id="22" dur="1" fill="hold">
+                                          <p:stCondLst>
+                                            <p:cond delay="0"/>
+                                          </p:stCondLst>
+                                        </p:cTn>
+                                        <p:tgtEl>
+                                          <p:spTgt spid="36"/>
+                                        </p:tgtEl>
+                                        <p:attrNameLst>
+                                          <p:attrName>style.visibility</p:attrName>
+                                        </p:attrNameLst>
+                                      </p:cBhvr>
+                                      <p:to>
+                                        <p:strVal val="visible"/>
+                                      </p:to>
+                                    </p:set>
+                                    <p:animEffect transition="in" filter="fade">
+                                      <p:cBhvr>
+                                        <p:cTn id="23" dur="500"/>
+                                        <p:tgtEl>
+                                          <p:spTgt spid="36"/>
+                                        </p:tgtEl>
+                                      </p:cBhvr>
+                                    </p:animEffect>
+                                  </p:childTnLst>
+                                </p:cTn>
+                              </p:par>
+                              <p:par>
+                                <p:cTn id="24" presetID="10" presetClass="entr" presetSubtype="0" fill="hold" nodeType="withEffect">
+                                  <p:stCondLst>
+                                    <p:cond delay="0"/>
+                                  </p:stCondLst>
+                                  <p:childTnLst>
+                                    <p:set>
+                                      <p:cBhvr>
+                                        <p:cTn id="25" dur="1" fill="hold">
+                                          <p:stCondLst>
+                                            <p:cond delay="0"/>
+                                          </p:stCondLst>
+                                        </p:cTn>
+                                        <p:tgtEl>
+                                          <p:spTgt spid="35"/>
+                                        </p:tgtEl>
+                                        <p:attrNameLst>
+                                          <p:attrName>style.visibility</p:attrName>
+                                        </p:attrNameLst>
+                                      </p:cBhvr>
+                                      <p:to>
+                                        <p:strVal val="visible"/>
+                                      </p:to>
+                                    </p:set>
+                                    <p:animEffect transition="in" filter="fade">
+                                      <p:cBhvr>
+                                        <p:cTn id="26" dur="500"/>
+                                        <p:tgtEl>
+                                          <p:spTgt spid="35"/>
+                                        </p:tgtEl>
+                                      </p:cBhvr>
+                                    </p:animEffect>
+                                  </p:childTnLst>
+                                </p:cTn>
+                              </p:par>
+                            </p:childTnLst>
+                          </p:cTn>
+                        </p:par>
+                      </p:childTnLst>
+                    </p:cTn>
+                  </p:par>
+                  <p:par>
+                    <p:cTn id="27" fill="hold">
+                      <p:stCondLst>
+                        <p:cond delay="indefinite"/>
+                      </p:stCondLst>
+                      <p:childTnLst>
+                        <p:par>
+                          <p:cTn id="28" fill="hold">
+                            <p:stCondLst>
+                              <p:cond delay="0"/>
+                            </p:stCondLst>
+                            <p:childTnLst>
+                              <p:par>
+                                <p:cTn id="29" presetID="10" presetClass="entr" presetSubtype="0" fill="hold" nodeType="clickEffect">
+                                  <p:stCondLst>
+                                    <p:cond delay="0"/>
+                                  </p:stCondLst>
+                                  <p:childTnLst>
+                                    <p:set>
+                                      <p:cBhvr>
+                                        <p:cTn id="30" dur="1" fill="hold">
+                                          <p:stCondLst>
+                                            <p:cond delay="0"/>
+                                          </p:stCondLst>
+                                        </p:cTn>
+                                        <p:tgtEl>
+                                          <p:spTgt spid="40"/>
+                                        </p:tgtEl>
+                                        <p:attrNameLst>
+                                          <p:attrName>style.visibility</p:attrName>
+                                        </p:attrNameLst>
+                                      </p:cBhvr>
+                                      <p:to>
+                                        <p:strVal val="visible"/>
+                                      </p:to>
+                                    </p:set>
+                                    <p:animEffect transition="in" filter="fade">
+                                      <p:cBhvr>
+                                        <p:cTn id="31" dur="500"/>
+                                        <p:tgtEl>
+                                          <p:spTgt spid="40"/>
+                                        </p:tgtEl>
+                                      </p:cBhvr>
+                                    </p:animEffect>
+                                  </p:childTnLst>
+                                </p:cTn>
+                              </p:par>
+                              <p:par>
+                                <p:cTn id="32" presetID="10" presetClass="entr" presetSubtype="0" fill="hold" grpId="0" nodeType="withEffect">
+                                  <p:stCondLst>
+                                    <p:cond delay="0"/>
+                                  </p:stCondLst>
+                                  <p:childTnLst>
+                                    <p:set>
+                                      <p:cBhvr>
+                                        <p:cTn id="33" dur="1" fill="hold">
+                                          <p:stCondLst>
+                                            <p:cond delay="0"/>
+                                          </p:stCondLst>
+                                        </p:cTn>
+                                        <p:tgtEl>
+                                          <p:spTgt spid="43"/>
+                                        </p:tgtEl>
+                                        <p:attrNameLst>
+                                          <p:attrName>style.visibility</p:attrName>
+                                        </p:attrNameLst>
+                                      </p:cBhvr>
+                                      <p:to>
+                                        <p:strVal val="visible"/>
+                                      </p:to>
+                                    </p:set>
+                                    <p:animEffect transition="in" filter="fade">
+                                      <p:cBhvr>
+                                        <p:cTn id="34" dur="500"/>
+                                        <p:tgtEl>
+                                          <p:spTgt spid="43"/>
+                                        </p:tgtEl>
+                                      </p:cBhvr>
+                                    </p:animEffect>
+                                  </p:childTnLst>
+                                </p:cTn>
+                              </p:par>
+                            </p:childTnLst>
+                          </p:cTn>
+                        </p:par>
+                      </p:childTnLst>
+                    </p:cTn>
+                  </p:par>
+                  <p:par>
+                    <p:cTn id="35" fill="hold">
+                      <p:stCondLst>
+                        <p:cond delay="indefinite"/>
+                      </p:stCondLst>
+                      <p:childTnLst>
+                        <p:par>
+                          <p:cTn id="36" fill="hold">
+                            <p:stCondLst>
+                              <p:cond delay="0"/>
+                            </p:stCondLst>
+                            <p:childTnLst>
+                              <p:par>
+                                <p:cTn id="37" presetID="10" presetClass="entr" presetSubtype="0" fill="hold" nodeType="clickEffect">
+                                  <p:stCondLst>
+                                    <p:cond delay="0"/>
+                                  </p:stCondLst>
+                                  <p:childTnLst>
+                                    <p:set>
+                                      <p:cBhvr>
+                                        <p:cTn id="38" dur="1" fill="hold">
+                                          <p:stCondLst>
+                                            <p:cond delay="0"/>
+                                          </p:stCondLst>
+                                        </p:cTn>
+                                        <p:tgtEl>
+                                          <p:spTgt spid="47"/>
+                                        </p:tgtEl>
+                                        <p:attrNameLst>
+                                          <p:attrName>style.visibility</p:attrName>
+                                        </p:attrNameLst>
+                                      </p:cBhvr>
+                                      <p:to>
+                                        <p:strVal val="visible"/>
+                                      </p:to>
+                                    </p:set>
+                                    <p:animEffect transition="in" filter="fade">
+                                      <p:cBhvr>
+                                        <p:cTn id="39" dur="500"/>
+                                        <p:tgtEl>
+                                          <p:spTgt spid="47"/>
+                                        </p:tgtEl>
+                                      </p:cBhvr>
+                                    </p:animEffect>
+                                  </p:childTnLst>
+                                </p:cTn>
+                              </p:par>
+                              <p:par>
+                                <p:cTn id="40" presetID="10" presetClass="entr" presetSubtype="0" fill="hold" nodeType="withEffect">
+                                  <p:stCondLst>
+                                    <p:cond delay="0"/>
+                                  </p:stCondLst>
+                                  <p:childTnLst>
+                                    <p:set>
+                                      <p:cBhvr>
+                                        <p:cTn id="41" dur="1" fill="hold">
+                                          <p:stCondLst>
+                                            <p:cond delay="0"/>
+                                          </p:stCondLst>
+                                        </p:cTn>
+                                        <p:tgtEl>
+                                          <p:spTgt spid="45"/>
+                                        </p:tgtEl>
+                                        <p:attrNameLst>
+                                          <p:attrName>style.visibility</p:attrName>
+                                        </p:attrNameLst>
+                                      </p:cBhvr>
+                                      <p:to>
+                                        <p:strVal val="visible"/>
+                                      </p:to>
+                                    </p:set>
+                                    <p:animEffect transition="in" filter="fade">
+                                      <p:cBhvr>
+                                        <p:cTn id="42" dur="500"/>
+                                        <p:tgtEl>
+                                          <p:spTgt spid="45"/>
+                                        </p:tgtEl>
+                                      </p:cBhvr>
+                                    </p:animEffect>
+                                  </p:childTnLst>
+                                </p:cTn>
+                              </p:par>
+                            </p:childTnLst>
+                          </p:cTn>
+                        </p:par>
+                      </p:childTnLst>
+                    </p:cTn>
+                  </p:par>
+                </p:childTnLst>
+              </p:cTn>
+              <p:prevCondLst>
+                <p:cond evt="onPrev" delay="0">
+                  <p:tgtEl>
+                    <p:sldTgt/>
+                  </p:tgtEl>
+                </p:cond>
+              </p:prevCondLst>
+              <p:nextCondLst>
+                <p:cond evt="onNext" delay="0">
+                  <p:tgtEl>
+                    <p:sldTgt/>
+                  </p:tgtEl>
+                </p:cond>
+              </p:nextCondLst>
+            </p:seq>
+          </p:childTnLst>
+        </p:cTn>
+      </p:par>
+    </p:tnLst>
+    <p:bldLst>
+      <p:bldP spid="25" grpId="0"/>
+      <p:bldP spid="32" grpId="0"/>
+      <p:bldP spid="36" grpId="0"/>
+      <p:bldP spid="43" grpId="0"/>
+    </p:bldLst>
+  </p:timing>
 </p:sld>
 </file>
 
@@ -35672,7 +37507,7 @@
           <a:graphicData uri="http://schemas.openxmlformats.org/presentationml/2006/ole">
             <mc:AlternateContent xmlns:mc="http://schemas.openxmlformats.org/markup-compatibility/2006">
               <mc:Choice xmlns:v="urn:schemas-microsoft-com:vml" Requires="v">
-                <p:oleObj spid="_x0000_s2136" name="Bitmap Image" r:id="rId4" imgW="12553920" imgH="8362800" progId="Paint.Picture">
+                <p:oleObj spid="_x0000_s2140" name="Bitmap Image" r:id="rId4" imgW="12553920" imgH="8362800" progId="Paint.Picture">
                   <p:embed/>
                 </p:oleObj>
               </mc:Choice>
@@ -38952,7 +40787,7 @@
           <a:graphicData uri="http://schemas.openxmlformats.org/presentationml/2006/ole">
             <mc:AlternateContent xmlns:mc="http://schemas.openxmlformats.org/markup-compatibility/2006">
               <mc:Choice xmlns:v="urn:schemas-microsoft-com:vml" Requires="v">
-                <p:oleObj spid="_x0000_s3158" name="Bitmap Image" r:id="rId4" imgW="17059320" imgH="5762520" progId="Paint.Picture">
+                <p:oleObj spid="_x0000_s3162" name="Bitmap Image" r:id="rId4" imgW="17059320" imgH="5762520" progId="Paint.Picture">
                   <p:embed/>
                 </p:oleObj>
               </mc:Choice>

</xml_diff>

<commit_message>
Example caching code sample
</commit_message>
<xml_diff>
--- a/2022-05-12 Designing Monolith First (TR)/Monolith First Presentation.pptx
+++ b/2022-05-12 Designing Monolith First (TR)/Monolith First Presentation.pptx
@@ -30986,7 +30986,7 @@
           <a:graphicData uri="http://schemas.openxmlformats.org/presentationml/2006/ole">
             <mc:AlternateContent xmlns:mc="http://schemas.openxmlformats.org/markup-compatibility/2006">
               <mc:Choice xmlns:v="urn:schemas-microsoft-com:vml" Requires="v">
-                <p:oleObj spid="_x0000_s4126" name="Bitmap Image" r:id="rId4" imgW="8801280" imgH="2933640" progId="Paint.Picture">
+                <p:oleObj spid="_x0000_s4129" name="Bitmap Image" r:id="rId4" imgW="8801280" imgH="2933640" progId="Paint.Picture">
                   <p:embed/>
                 </p:oleObj>
               </mc:Choice>
@@ -31180,7 +31180,7 @@
           <a:graphicData uri="http://schemas.openxmlformats.org/presentationml/2006/ole">
             <mc:AlternateContent xmlns:mc="http://schemas.openxmlformats.org/markup-compatibility/2006">
               <mc:Choice xmlns:v="urn:schemas-microsoft-com:vml" Requires="v">
-                <p:oleObj spid="_x0000_s5150" name="Bitmap Image" r:id="rId4" imgW="8744040" imgH="3753000" progId="Paint.Picture">
+                <p:oleObj spid="_x0000_s5153" name="Bitmap Image" r:id="rId4" imgW="8744040" imgH="3753000" progId="Paint.Picture">
                   <p:embed/>
                 </p:oleObj>
               </mc:Choice>
@@ -37328,48 +37328,6 @@
       </p:grpSpPr>
       <p:sp>
         <p:nvSpPr>
-          <p:cNvPr id="3" name="Content Placeholder 2">
-            <a:extLst>
-              <a:ext uri="{FF2B5EF4-FFF2-40B4-BE49-F238E27FC236}">
-                <a16:creationId xmlns:a16="http://schemas.microsoft.com/office/drawing/2014/main" id="{891C7693-D3DF-4635-96F4-97F3B4136FDF}"/>
-              </a:ext>
-            </a:extLst>
-          </p:cNvPr>
-          <p:cNvSpPr>
-            <a:spLocks noGrp="1"/>
-          </p:cNvSpPr>
-          <p:nvPr>
-            <p:ph idx="1"/>
-          </p:nvPr>
-        </p:nvSpPr>
-        <p:spPr/>
-        <p:txBody>
-          <a:bodyPr/>
-          <a:lstStyle/>
-          <a:p>
-            <a:r>
-              <a:rPr lang="en-US" dirty="0">
-                <a:latin typeface="Euclid Circular B" panose="020B0504000000000000" pitchFamily="34" charset="0"/>
-                <a:ea typeface="Euclid Circular B" panose="020B0504000000000000" pitchFamily="34" charset="0"/>
-              </a:rPr>
-              <a:t>TODO</a:t>
-            </a:r>
-            <a:r>
-              <a:rPr lang="en-US">
-                <a:latin typeface="Euclid Circular B" panose="020B0504000000000000" pitchFamily="34" charset="0"/>
-                <a:ea typeface="Euclid Circular B" panose="020B0504000000000000" pitchFamily="34" charset="0"/>
-              </a:rPr>
-              <a:t>: ...</a:t>
-            </a:r>
-            <a:endParaRPr lang="en-US" dirty="0">
-              <a:latin typeface="Euclid Circular B" panose="020B0504000000000000" pitchFamily="34" charset="0"/>
-              <a:ea typeface="Euclid Circular B" panose="020B0504000000000000" pitchFamily="34" charset="0"/>
-            </a:endParaRPr>
-          </a:p>
-        </p:txBody>
-      </p:sp>
-      <p:sp>
-        <p:nvSpPr>
           <p:cNvPr id="6" name="Title 1">
             <a:extLst>
               <a:ext uri="{FF2B5EF4-FFF2-40B4-BE49-F238E27FC236}">
@@ -37416,14 +37374,14 @@
               </a:rPr>
             </a:br>
             <a:r>
-              <a:rPr lang="en-US" sz="3200" b="1" i="1" dirty="0" err="1">
+              <a:rPr lang="en-US" sz="3200" b="1" i="1" dirty="0">
                 <a:solidFill>
                   <a:srgbClr val="292D33"/>
                 </a:solidFill>
                 <a:latin typeface="Euclid Circular B" panose="020B0504000000000000" pitchFamily="34" charset="0"/>
                 <a:ea typeface="Euclid Circular B" panose="020B0504000000000000" pitchFamily="34" charset="0"/>
               </a:rPr>
-              <a:t>subheader</a:t>
+              <a:t>Synchronous communication: caching</a:t>
             </a:r>
             <a:endParaRPr lang="en-US" b="1" dirty="0">
               <a:solidFill>
@@ -37435,6 +37393,36 @@
           </a:p>
         </p:txBody>
       </p:sp>
+      <p:pic>
+        <p:nvPicPr>
+          <p:cNvPr id="12" name="Picture 11">
+            <a:extLst>
+              <a:ext uri="{FF2B5EF4-FFF2-40B4-BE49-F238E27FC236}">
+                <a16:creationId xmlns:a16="http://schemas.microsoft.com/office/drawing/2014/main" id="{7CC43CC1-9B12-42E3-A2A6-BFB2866CF9C2}"/>
+              </a:ext>
+            </a:extLst>
+          </p:cNvPr>
+          <p:cNvPicPr>
+            <a:picLocks noChangeAspect="1"/>
+          </p:cNvPicPr>
+          <p:nvPr/>
+        </p:nvPicPr>
+        <p:blipFill>
+          <a:blip r:embed="rId3"/>
+          <a:stretch>
+            <a:fillRect/>
+          </a:stretch>
+        </p:blipFill>
+        <p:spPr>
+          <a:xfrm>
+            <a:off x="1524000" y="1985411"/>
+            <a:ext cx="9144000" cy="3695700"/>
+          </a:xfrm>
+          <a:prstGeom prst="rect">
+            <a:avLst/>
+          </a:prstGeom>
+        </p:spPr>
+      </p:pic>
     </p:spTree>
     <p:extLst>
       <p:ext uri="{BB962C8B-B14F-4D97-AF65-F5344CB8AC3E}">
@@ -37507,7 +37495,7 @@
           <a:graphicData uri="http://schemas.openxmlformats.org/presentationml/2006/ole">
             <mc:AlternateContent xmlns:mc="http://schemas.openxmlformats.org/markup-compatibility/2006">
               <mc:Choice xmlns:v="urn:schemas-microsoft-com:vml" Requires="v">
-                <p:oleObj spid="_x0000_s2140" name="Bitmap Image" r:id="rId4" imgW="12553920" imgH="8362800" progId="Paint.Picture">
+                <p:oleObj spid="_x0000_s2143" name="Bitmap Image" r:id="rId4" imgW="12553920" imgH="8362800" progId="Paint.Picture">
                   <p:embed/>
                 </p:oleObj>
               </mc:Choice>
@@ -37588,48 +37576,6 @@
       </p:grpSpPr>
       <p:sp>
         <p:nvSpPr>
-          <p:cNvPr id="3" name="Content Placeholder 2">
-            <a:extLst>
-              <a:ext uri="{FF2B5EF4-FFF2-40B4-BE49-F238E27FC236}">
-                <a16:creationId xmlns:a16="http://schemas.microsoft.com/office/drawing/2014/main" id="{891C7693-D3DF-4635-96F4-97F3B4136FDF}"/>
-              </a:ext>
-            </a:extLst>
-          </p:cNvPr>
-          <p:cNvSpPr>
-            <a:spLocks noGrp="1"/>
-          </p:cNvSpPr>
-          <p:nvPr>
-            <p:ph idx="1"/>
-          </p:nvPr>
-        </p:nvSpPr>
-        <p:spPr/>
-        <p:txBody>
-          <a:bodyPr/>
-          <a:lstStyle/>
-          <a:p>
-            <a:r>
-              <a:rPr lang="en-US" dirty="0">
-                <a:latin typeface="Euclid Circular B" panose="020B0504000000000000" pitchFamily="34" charset="0"/>
-                <a:ea typeface="Euclid Circular B" panose="020B0504000000000000" pitchFamily="34" charset="0"/>
-              </a:rPr>
-              <a:t>TODO</a:t>
-            </a:r>
-            <a:r>
-              <a:rPr lang="en-US">
-                <a:latin typeface="Euclid Circular B" panose="020B0504000000000000" pitchFamily="34" charset="0"/>
-                <a:ea typeface="Euclid Circular B" panose="020B0504000000000000" pitchFamily="34" charset="0"/>
-              </a:rPr>
-              <a:t>: ...</a:t>
-            </a:r>
-            <a:endParaRPr lang="en-US" dirty="0">
-              <a:latin typeface="Euclid Circular B" panose="020B0504000000000000" pitchFamily="34" charset="0"/>
-              <a:ea typeface="Euclid Circular B" panose="020B0504000000000000" pitchFamily="34" charset="0"/>
-            </a:endParaRPr>
-          </a:p>
-        </p:txBody>
-      </p:sp>
-      <p:sp>
-        <p:nvSpPr>
           <p:cNvPr id="6" name="Title 1">
             <a:extLst>
               <a:ext uri="{FF2B5EF4-FFF2-40B4-BE49-F238E27FC236}">
@@ -37657,7 +37603,7 @@
           <a:lstStyle/>
           <a:p>
             <a:r>
-              <a:rPr lang="en-US" b="1" dirty="0">
+              <a:rPr lang="en-US" b="1">
                 <a:solidFill>
                   <a:srgbClr val="292D33"/>
                 </a:solidFill>
@@ -37667,7 +37613,7 @@
               <a:t>Integrating the modules</a:t>
             </a:r>
             <a:br>
-              <a:rPr lang="en-US" b="1" dirty="0">
+              <a:rPr lang="en-US" b="1">
                 <a:solidFill>
                   <a:srgbClr val="292D33"/>
                 </a:solidFill>
@@ -37676,14 +37622,14 @@
               </a:rPr>
             </a:br>
             <a:r>
-              <a:rPr lang="en-US" sz="3200" b="1" i="1" dirty="0" err="1">
+              <a:rPr lang="en-US" sz="3200" b="1" i="1">
                 <a:solidFill>
                   <a:srgbClr val="292D33"/>
                 </a:solidFill>
                 <a:latin typeface="Euclid Circular B" panose="020B0504000000000000" pitchFamily="34" charset="0"/>
                 <a:ea typeface="Euclid Circular B" panose="020B0504000000000000" pitchFamily="34" charset="0"/>
               </a:rPr>
-              <a:t>subheader</a:t>
+              <a:t>Synchronous communication: caching</a:t>
             </a:r>
             <a:endParaRPr lang="en-US" b="1" dirty="0">
               <a:solidFill>
@@ -37695,6 +37641,36 @@
           </a:p>
         </p:txBody>
       </p:sp>
+      <p:pic>
+        <p:nvPicPr>
+          <p:cNvPr id="8" name="Picture 7">
+            <a:extLst>
+              <a:ext uri="{FF2B5EF4-FFF2-40B4-BE49-F238E27FC236}">
+                <a16:creationId xmlns:a16="http://schemas.microsoft.com/office/drawing/2014/main" id="{7D6507C5-7810-44EC-B796-226B71B14E44}"/>
+              </a:ext>
+            </a:extLst>
+          </p:cNvPr>
+          <p:cNvPicPr>
+            <a:picLocks noChangeAspect="1"/>
+          </p:cNvPicPr>
+          <p:nvPr/>
+        </p:nvPicPr>
+        <p:blipFill>
+          <a:blip r:embed="rId3"/>
+          <a:stretch>
+            <a:fillRect/>
+          </a:stretch>
+        </p:blipFill>
+        <p:spPr>
+          <a:xfrm>
+            <a:off x="706454" y="2279884"/>
+            <a:ext cx="11087100" cy="2952750"/>
+          </a:xfrm>
+          <a:prstGeom prst="rect">
+            <a:avLst/>
+          </a:prstGeom>
+        </p:spPr>
+      </p:pic>
     </p:spTree>
     <p:extLst>
       <p:ext uri="{BB962C8B-B14F-4D97-AF65-F5344CB8AC3E}">
@@ -40787,7 +40763,7 @@
           <a:graphicData uri="http://schemas.openxmlformats.org/presentationml/2006/ole">
             <mc:AlternateContent xmlns:mc="http://schemas.openxmlformats.org/markup-compatibility/2006">
               <mc:Choice xmlns:v="urn:schemas-microsoft-com:vml" Requires="v">
-                <p:oleObj spid="_x0000_s3162" name="Bitmap Image" r:id="rId4" imgW="17059320" imgH="5762520" progId="Paint.Picture">
+                <p:oleObj spid="_x0000_s3165" name="Bitmap Image" r:id="rId4" imgW="17059320" imgH="5762520" progId="Paint.Picture">
                   <p:embed/>
                 </p:oleObj>
               </mc:Choice>

</xml_diff>